<commit_message>
Update Week 4 Lecture 2 - Solution ID Equation.pptx
</commit_message>
<xml_diff>
--- a/PP WORK/Instructor Version/Week 4/Week 4 Lecture 2 - Solution ID Equation.pptx
+++ b/PP WORK/Instructor Version/Week 4/Week 4 Lecture 2 - Solution ID Equation.pptx
@@ -124,7 +124,7 @@
   </p:defaultTextStyle>
   <p:extLst>
     <p:ext uri="{EFAFB233-063F-42B5-8137-9DF3F51BA10A}">
-      <p15:sldGuideLst xmlns:p15="http://schemas.microsoft.com/office/powerpoint/2012/main"/>
+      <p15:sldGuideLst xmlns:p15="http://schemas.microsoft.com/office/powerpoint/2012/main" xmlns=""/>
     </p:ext>
   </p:extLst>
 </p:presentation>
@@ -212,7 +212,7 @@
           <a:p>
             <a:fld id="{18AB4343-410D-4114-8175-E2D7C9308D80}" type="datetimeFigureOut">
               <a:rPr lang="en-US" smtClean="0"/>
-              <a:t>10/15/2024</a:t>
+              <a:t>1/13/2025</a:t>
             </a:fld>
             <a:endParaRPr lang="en-US"/>
           </a:p>
@@ -1392,7 +1392,7 @@
           <a:p>
             <a:fld id="{1D8BD707-D9CF-40AE-B4C6-C98DA3205C09}" type="datetimeFigureOut">
               <a:rPr lang="en-US"/>
-              <a:t>10/15/2024</a:t>
+              <a:t>1/13/2025</a:t>
             </a:fld>
             <a:endParaRPr lang="en-US"/>
           </a:p>
@@ -1562,7 +1562,7 @@
           <a:p>
             <a:fld id="{1D8BD707-D9CF-40AE-B4C6-C98DA3205C09}" type="datetimeFigureOut">
               <a:rPr lang="en-US"/>
-              <a:t>10/15/2024</a:t>
+              <a:t>1/13/2025</a:t>
             </a:fld>
             <a:endParaRPr lang="en-US"/>
           </a:p>
@@ -1775,7 +1775,7 @@
           <a:p>
             <a:fld id="{1D8BD707-D9CF-40AE-B4C6-C98DA3205C09}" type="datetimeFigureOut">
               <a:rPr lang="en-US"/>
-              <a:t>10/15/2024</a:t>
+              <a:t>1/13/2025</a:t>
             </a:fld>
             <a:endParaRPr lang="en-US"/>
           </a:p>
@@ -1922,7 +1922,7 @@
           <a:p>
             <a:fld id="{1D8BD707-D9CF-40AE-B4C6-C98DA3205C09}" type="datetimeFigureOut">
               <a:rPr lang="en-US"/>
-              <a:t>10/15/2024</a:t>
+              <a:t>1/13/2025</a:t>
             </a:fld>
             <a:endParaRPr lang="en-US"/>
           </a:p>
@@ -1995,7 +1995,7 @@
           <p:cNvPr id="2" name="Title 1">
             <a:extLst>
               <a:ext uri="{FF2B5EF4-FFF2-40B4-BE49-F238E27FC236}">
-                <a16:creationId xmlns:a16="http://schemas.microsoft.com/office/drawing/2014/main" id="{8267C4E5-55F7-DB05-186B-06791E1D1784}"/>
+                <a16:creationId xmlns:a16="http://schemas.microsoft.com/office/drawing/2014/main" xmlns="" id="{8267C4E5-55F7-DB05-186B-06791E1D1784}"/>
               </a:ext>
             </a:extLst>
           </p:cNvPr>
@@ -2024,7 +2024,7 @@
           <p:cNvPr id="3" name="Footer Placeholder 2">
             <a:extLst>
               <a:ext uri="{FF2B5EF4-FFF2-40B4-BE49-F238E27FC236}">
-                <a16:creationId xmlns:a16="http://schemas.microsoft.com/office/drawing/2014/main" id="{B3AA35ED-DF99-6958-28FA-33A93BB97722}"/>
+                <a16:creationId xmlns:a16="http://schemas.microsoft.com/office/drawing/2014/main" xmlns="" id="{B3AA35ED-DF99-6958-28FA-33A93BB97722}"/>
               </a:ext>
             </a:extLst>
           </p:cNvPr>
@@ -2049,7 +2049,7 @@
           <p:cNvPr id="4" name="Date Placeholder 3">
             <a:extLst>
               <a:ext uri="{FF2B5EF4-FFF2-40B4-BE49-F238E27FC236}">
-                <a16:creationId xmlns:a16="http://schemas.microsoft.com/office/drawing/2014/main" id="{55503DB0-5264-6061-D4B6-AE3D944FC839}"/>
+                <a16:creationId xmlns:a16="http://schemas.microsoft.com/office/drawing/2014/main" xmlns="" id="{55503DB0-5264-6061-D4B6-AE3D944FC839}"/>
               </a:ext>
             </a:extLst>
           </p:cNvPr>
@@ -2067,7 +2067,7 @@
           <a:p>
             <a:fld id="{1D8BD707-D9CF-40AE-B4C6-C98DA3205C09}" type="datetimeFigureOut">
               <a:rPr lang="en-US" smtClean="0"/>
-              <a:t>10/15/2024</a:t>
+              <a:t>1/13/2025</a:t>
             </a:fld>
             <a:endParaRPr lang="en-US"/>
           </a:p>
@@ -2078,7 +2078,7 @@
           <p:cNvPr id="5" name="Slide Number Placeholder 4">
             <a:extLst>
               <a:ext uri="{FF2B5EF4-FFF2-40B4-BE49-F238E27FC236}">
-                <a16:creationId xmlns:a16="http://schemas.microsoft.com/office/drawing/2014/main" id="{306C615E-9D94-7E15-4EC3-69D6111D00EE}"/>
+                <a16:creationId xmlns:a16="http://schemas.microsoft.com/office/drawing/2014/main" xmlns="" id="{306C615E-9D94-7E15-4EC3-69D6111D00EE}"/>
               </a:ext>
             </a:extLst>
           </p:cNvPr>
@@ -2188,7 +2188,7 @@
           <a:p>
             <a:fld id="{1D8BD707-D9CF-40AE-B4C6-C98DA3205C09}" type="datetimeFigureOut">
               <a:rPr lang="en-US"/>
-              <a:t>10/15/2024</a:t>
+              <a:t>1/13/2025</a:t>
             </a:fld>
             <a:endParaRPr lang="en-US"/>
           </a:p>
@@ -2261,7 +2261,7 @@
           <p:cNvPr id="25" name="Rectangle 24">
             <a:extLst>
               <a:ext uri="{FF2B5EF4-FFF2-40B4-BE49-F238E27FC236}">
-                <a16:creationId xmlns:a16="http://schemas.microsoft.com/office/drawing/2014/main" id="{669E0535-6FD9-4D8F-80CA-FF7A96DB665F}"/>
+                <a16:creationId xmlns:a16="http://schemas.microsoft.com/office/drawing/2014/main" xmlns="" id="{669E0535-6FD9-4D8F-80CA-FF7A96DB665F}"/>
               </a:ext>
             </a:extLst>
           </p:cNvPr>
@@ -2304,7 +2304,7 @@
           <a:lstStyle/>
           <a:p>
             <a:pPr algn="ctr"/>
-            <a:endParaRPr lang="en-KW" sz="2400"/>
+            <a:endParaRPr lang="x-none" sz="2400"/>
           </a:p>
         </p:txBody>
       </p:sp>
@@ -2313,7 +2313,7 @@
           <p:cNvPr id="26" name="Picture 25" descr="A black and red background with a bird&#10;&#10;Description automatically generated">
             <a:extLst>
               <a:ext uri="{FF2B5EF4-FFF2-40B4-BE49-F238E27FC236}">
-                <a16:creationId xmlns:a16="http://schemas.microsoft.com/office/drawing/2014/main" id="{7356EFA9-D406-4147-B1F7-82B217840839}"/>
+                <a16:creationId xmlns:a16="http://schemas.microsoft.com/office/drawing/2014/main" xmlns="" id="{7356EFA9-D406-4147-B1F7-82B217840839}"/>
               </a:ext>
             </a:extLst>
           </p:cNvPr>
@@ -2343,7 +2343,7 @@
           <p:cNvPr id="27" name="Google Shape;15;p13">
             <a:extLst>
               <a:ext uri="{FF2B5EF4-FFF2-40B4-BE49-F238E27FC236}">
-                <a16:creationId xmlns:a16="http://schemas.microsoft.com/office/drawing/2014/main" id="{F5F3B15A-58C1-48A3-AB6A-E8A3A8F0B1F0}"/>
+                <a16:creationId xmlns:a16="http://schemas.microsoft.com/office/drawing/2014/main" xmlns="" id="{F5F3B15A-58C1-48A3-AB6A-E8A3A8F0B1F0}"/>
               </a:ext>
             </a:extLst>
           </p:cNvPr>
@@ -2509,7 +2509,7 @@
           <p:cNvPr id="28" name="Google Shape;19;p14">
             <a:extLst>
               <a:ext uri="{FF2B5EF4-FFF2-40B4-BE49-F238E27FC236}">
-                <a16:creationId xmlns:a16="http://schemas.microsoft.com/office/drawing/2014/main" id="{A6353D6C-199F-4C21-9FC8-2D00FAAA26A6}"/>
+                <a16:creationId xmlns:a16="http://schemas.microsoft.com/office/drawing/2014/main" xmlns="" id="{A6353D6C-199F-4C21-9FC8-2D00FAAA26A6}"/>
               </a:ext>
             </a:extLst>
           </p:cNvPr>
@@ -2788,7 +2788,7 @@
           <p:cNvPr id="29" name="Google Shape;55;p1">
             <a:extLst>
               <a:ext uri="{FF2B5EF4-FFF2-40B4-BE49-F238E27FC236}">
-                <a16:creationId xmlns:a16="http://schemas.microsoft.com/office/drawing/2014/main" id="{4544F053-DAFF-4191-A4FE-EAC318BF6A0C}"/>
+                <a16:creationId xmlns:a16="http://schemas.microsoft.com/office/drawing/2014/main" xmlns="" id="{4544F053-DAFF-4191-A4FE-EAC318BF6A0C}"/>
               </a:ext>
             </a:extLst>
           </p:cNvPr>
@@ -2860,7 +2860,7 @@
           <p:cNvPr id="2" name="Title 1">
             <a:extLst>
               <a:ext uri="{FF2B5EF4-FFF2-40B4-BE49-F238E27FC236}">
-                <a16:creationId xmlns:a16="http://schemas.microsoft.com/office/drawing/2014/main" id="{7B6E2517-3805-41A0-9280-523D3C8CC82F}"/>
+                <a16:creationId xmlns:a16="http://schemas.microsoft.com/office/drawing/2014/main" xmlns="" id="{7B6E2517-3805-41A0-9280-523D3C8CC82F}"/>
               </a:ext>
             </a:extLst>
           </p:cNvPr>
@@ -2932,7 +2932,7 @@
           <p:cNvPr id="8" name="Google Shape;54;p1">
             <a:extLst>
               <a:ext uri="{FF2B5EF4-FFF2-40B4-BE49-F238E27FC236}">
-                <a16:creationId xmlns:a16="http://schemas.microsoft.com/office/drawing/2014/main" id="{631C2DF5-1362-47E0-9992-CA0F5EE5E7F4}"/>
+                <a16:creationId xmlns:a16="http://schemas.microsoft.com/office/drawing/2014/main" xmlns="" id="{631C2DF5-1362-47E0-9992-CA0F5EE5E7F4}"/>
               </a:ext>
             </a:extLst>
           </p:cNvPr>
@@ -3019,7 +3019,7 @@
           <p:cNvPr id="9" name="Google Shape;55;p1">
             <a:extLst>
               <a:ext uri="{FF2B5EF4-FFF2-40B4-BE49-F238E27FC236}">
-                <a16:creationId xmlns:a16="http://schemas.microsoft.com/office/drawing/2014/main" id="{E5E4EFC6-10AC-457A-90BE-EB16C5D5FDC1}"/>
+                <a16:creationId xmlns:a16="http://schemas.microsoft.com/office/drawing/2014/main" xmlns="" id="{E5E4EFC6-10AC-457A-90BE-EB16C5D5FDC1}"/>
               </a:ext>
             </a:extLst>
           </p:cNvPr>
@@ -3091,7 +3091,7 @@
           <p:cNvPr id="10" name="Oval 9">
             <a:extLst>
               <a:ext uri="{FF2B5EF4-FFF2-40B4-BE49-F238E27FC236}">
-                <a16:creationId xmlns:a16="http://schemas.microsoft.com/office/drawing/2014/main" id="{38DC77A7-8710-436F-B5E7-19B60E66B5F0}"/>
+                <a16:creationId xmlns:a16="http://schemas.microsoft.com/office/drawing/2014/main" xmlns="" id="{38DC77A7-8710-436F-B5E7-19B60E66B5F0}"/>
               </a:ext>
             </a:extLst>
           </p:cNvPr>
@@ -3134,7 +3134,7 @@
           <a:lstStyle/>
           <a:p>
             <a:pPr algn="ctr"/>
-            <a:endParaRPr lang="en-KW" sz="2400"/>
+            <a:endParaRPr lang="x-none" sz="2400"/>
           </a:p>
         </p:txBody>
       </p:sp>
@@ -3143,7 +3143,7 @@
           <p:cNvPr id="11" name="Picture 10" descr="A red and white background with a design&#10;&#10;Description automatically generated">
             <a:extLst>
               <a:ext uri="{FF2B5EF4-FFF2-40B4-BE49-F238E27FC236}">
-                <a16:creationId xmlns:a16="http://schemas.microsoft.com/office/drawing/2014/main" id="{418E62F8-02A7-4379-A005-0EF5EC635BBF}"/>
+                <a16:creationId xmlns:a16="http://schemas.microsoft.com/office/drawing/2014/main" xmlns="" id="{418E62F8-02A7-4379-A005-0EF5EC635BBF}"/>
               </a:ext>
             </a:extLst>
           </p:cNvPr>
@@ -3173,7 +3173,7 @@
           <p:cNvPr id="12" name="Picture 11">
             <a:extLst>
               <a:ext uri="{FF2B5EF4-FFF2-40B4-BE49-F238E27FC236}">
-                <a16:creationId xmlns:a16="http://schemas.microsoft.com/office/drawing/2014/main" id="{28A0ADE9-7A46-486B-82F3-A690D904DFF4}"/>
+                <a16:creationId xmlns:a16="http://schemas.microsoft.com/office/drawing/2014/main" xmlns="" id="{28A0ADE9-7A46-486B-82F3-A690D904DFF4}"/>
               </a:ext>
             </a:extLst>
           </p:cNvPr>
@@ -3400,7 +3400,7 @@
           <a:p>
             <a:fld id="{1D8BD707-D9CF-40AE-B4C6-C98DA3205C09}" type="datetimeFigureOut">
               <a:rPr lang="en-US"/>
-              <a:t>10/15/2024</a:t>
+              <a:t>1/13/2025</a:t>
             </a:fld>
             <a:endParaRPr lang="en-US"/>
           </a:p>
@@ -3661,7 +3661,7 @@
             <a:r>
               <a:rPr lang="en-US" sz="3600" b="1" dirty="0">
                 <a:solidFill>
-                  <a:srgbClr val="00B050"/>
+                  <a:srgbClr val="0033CC"/>
                 </a:solidFill>
                 <a:latin typeface="Arial" pitchFamily="34" charset="0"/>
                 <a:cs typeface="Arial" pitchFamily="34" charset="0"/>
@@ -3674,7 +3674,7 @@
             <a:r>
               <a:rPr lang="x-none" sz="3600" b="1" dirty="0">
                 <a:solidFill>
-                  <a:srgbClr val="00B050"/>
+                  <a:srgbClr val="0033CC"/>
                 </a:solidFill>
                 <a:latin typeface="Arial" pitchFamily="34" charset="0"/>
                 <a:cs typeface="Arial" pitchFamily="34" charset="0"/>
@@ -3684,7 +3684,7 @@
             <a:r>
               <a:rPr lang="en-US" sz="3600" b="1" dirty="0">
                 <a:solidFill>
-                  <a:srgbClr val="00B050"/>
+                  <a:srgbClr val="0033CC"/>
                 </a:solidFill>
                 <a:latin typeface="Arial" pitchFamily="34" charset="0"/>
                 <a:cs typeface="Arial" pitchFamily="34" charset="0"/>
@@ -3694,23 +3694,40 @@
             <a:r>
               <a:rPr lang="x-none" sz="3600" b="1" dirty="0">
                 <a:solidFill>
-                  <a:srgbClr val="00B050"/>
+                  <a:srgbClr val="0033CC"/>
                 </a:solidFill>
                 <a:latin typeface="Arial" pitchFamily="34" charset="0"/>
                 <a:cs typeface="Arial" pitchFamily="34" charset="0"/>
               </a:rPr>
-              <a:t> 20</a:t>
+              <a:t> </a:t>
             </a:r>
             <a:r>
-              <a:rPr lang="en-US" sz="3600" b="1" dirty="0">
+              <a:rPr lang="x-none" sz="3600" b="1">
                 <a:solidFill>
-                  <a:srgbClr val="00B050"/>
+                  <a:srgbClr val="0033CC"/>
                 </a:solidFill>
                 <a:latin typeface="Arial" pitchFamily="34" charset="0"/>
                 <a:cs typeface="Arial" pitchFamily="34" charset="0"/>
               </a:rPr>
-              <a:t>2</a:t>
+              <a:t>20</a:t>
             </a:r>
+            <a:r>
+              <a:rPr lang="en-US" sz="3600" b="1" dirty="0" smtClean="0">
+                <a:solidFill>
+                  <a:srgbClr val="0033CC"/>
+                </a:solidFill>
+                <a:latin typeface="Arial" pitchFamily="34" charset="0"/>
+                <a:cs typeface="Arial" pitchFamily="34" charset="0"/>
+              </a:rPr>
+              <a:t>2 – Spring 2025</a:t>
+            </a:r>
+            <a:endParaRPr lang="en-US" sz="3600" b="1" dirty="0">
+              <a:solidFill>
+                <a:srgbClr val="0033CC"/>
+              </a:solidFill>
+              <a:latin typeface="Arial" pitchFamily="34" charset="0"/>
+              <a:cs typeface="Arial" pitchFamily="34" charset="0"/>
+            </a:endParaRPr>
           </a:p>
         </p:txBody>
       </p:sp>
@@ -3719,7 +3736,7 @@
           <p:cNvPr id="2" name="TextBox 1">
             <a:extLst>
               <a:ext uri="{FF2B5EF4-FFF2-40B4-BE49-F238E27FC236}">
-                <a16:creationId xmlns:a16="http://schemas.microsoft.com/office/drawing/2014/main" id="{07DEEC26-75A9-F4A2-6948-691F17B753B2}"/>
+                <a16:creationId xmlns:a16="http://schemas.microsoft.com/office/drawing/2014/main" xmlns="" id="{07DEEC26-75A9-F4A2-6948-691F17B753B2}"/>
               </a:ext>
             </a:extLst>
           </p:cNvPr>
@@ -3745,7 +3762,7 @@
             <a:r>
               <a:rPr lang="en-US" sz="4400" b="1" dirty="0">
                 <a:solidFill>
-                  <a:srgbClr val="0000FF"/>
+                  <a:srgbClr val="00B050"/>
                 </a:solidFill>
                 <a:latin typeface="Cambria" panose="02040503050406030204" pitchFamily="18" charset="0"/>
               </a:rPr>
@@ -3825,7 +3842,7 @@
                         <m:dPr>
                           <m:ctrlPr>
                             <a:rPr lang="en-US" sz="2800" b="0" i="1" smtClean="0">
-                              <a:latin typeface="Cambria Math" panose="02040503050406030204" pitchFamily="18" charset="0"/>
+                              <a:latin typeface="Cambria Math"/>
                             </a:rPr>
                           </m:ctrlPr>
                         </m:dPr>
@@ -3842,7 +3859,7 @@
                         <m:dPr>
                           <m:ctrlPr>
                             <a:rPr lang="en-US" sz="2800" b="0" i="1" smtClean="0">
-                              <a:latin typeface="Cambria Math" panose="02040503050406030204" pitchFamily="18" charset="0"/>
+                              <a:latin typeface="Cambria Math"/>
                             </a:rPr>
                           </m:ctrlPr>
                         </m:dPr>
@@ -3851,7 +3868,7 @@
                             <m:fPr>
                               <m:ctrlPr>
                                 <a:rPr lang="en-US" sz="2800" b="0" i="1" smtClean="0">
-                                  <a:latin typeface="Cambria Math" panose="02040503050406030204" pitchFamily="18" charset="0"/>
+                                  <a:latin typeface="Cambria Math"/>
                                 </a:rPr>
                               </m:ctrlPr>
                             </m:fPr>
@@ -3866,7 +3883,7 @@
                                 <m:sSupPr>
                                   <m:ctrlPr>
                                     <a:rPr lang="en-US" sz="2800" b="0" i="1" smtClean="0">
-                                      <a:latin typeface="Cambria Math" panose="02040503050406030204" pitchFamily="18" charset="0"/>
+                                      <a:latin typeface="Cambria Math"/>
                                     </a:rPr>
                                   </m:ctrlPr>
                                 </m:sSupPr>
@@ -3909,7 +3926,7 @@
                         <m:fPr>
                           <m:ctrlPr>
                             <a:rPr lang="en-US" sz="2800" b="0" i="1" smtClean="0">
-                              <a:latin typeface="Cambria Math" panose="02040503050406030204" pitchFamily="18" charset="0"/>
+                              <a:latin typeface="Cambria Math"/>
                             </a:rPr>
                           </m:ctrlPr>
                         </m:fPr>
@@ -3946,7 +3963,7 @@
                         <m:dPr>
                           <m:ctrlPr>
                             <a:rPr lang="en-US" sz="2800" i="1">
-                              <a:latin typeface="Cambria Math" panose="02040503050406030204" pitchFamily="18" charset="0"/>
+                              <a:latin typeface="Cambria Math"/>
                             </a:rPr>
                           </m:ctrlPr>
                         </m:dPr>
@@ -3955,7 +3972,7 @@
                             <m:sSupPr>
                               <m:ctrlPr>
                                 <a:rPr lang="en-US" sz="2800" i="1">
-                                  <a:latin typeface="Cambria Math" panose="02040503050406030204" pitchFamily="18" charset="0"/>
+                                  <a:latin typeface="Cambria Math"/>
                                 </a:rPr>
                               </m:ctrlPr>
                             </m:sSupPr>
@@ -4066,7 +4083,7 @@
                         <m:dPr>
                           <m:ctrlPr>
                             <a:rPr lang="en-US" sz="2800" b="0" i="1" smtClean="0">
-                              <a:latin typeface="Cambria Math" panose="02040503050406030204" pitchFamily="18" charset="0"/>
+                              <a:latin typeface="Cambria Math"/>
                             </a:rPr>
                           </m:ctrlPr>
                         </m:dPr>
@@ -4089,7 +4106,7 @@
                         <m:fPr>
                           <m:ctrlPr>
                             <a:rPr lang="en-US" sz="2800" b="0" i="1" smtClean="0">
-                              <a:latin typeface="Cambria Math" panose="02040503050406030204" pitchFamily="18" charset="0"/>
+                              <a:latin typeface="Cambria Math"/>
                             </a:rPr>
                           </m:ctrlPr>
                         </m:fPr>
@@ -4112,7 +4129,7 @@
                             <m:sSupPr>
                               <m:ctrlPr>
                                 <a:rPr lang="en-US" sz="2800" b="0" i="1" smtClean="0">
-                                  <a:latin typeface="Cambria Math" panose="02040503050406030204" pitchFamily="18" charset="0"/>
+                                  <a:latin typeface="Cambria Math"/>
                                 </a:rPr>
                               </m:ctrlPr>
                             </m:sSupPr>
@@ -4151,7 +4168,7 @@
                         <m:fPr>
                           <m:ctrlPr>
                             <a:rPr lang="en-US" sz="2800" b="0" i="1" smtClean="0">
-                              <a:latin typeface="Cambria Math" panose="02040503050406030204" pitchFamily="18" charset="0"/>
+                              <a:latin typeface="Cambria Math"/>
                             </a:rPr>
                           </m:ctrlPr>
                         </m:fPr>
@@ -4172,7 +4189,7 @@
                             <m:dPr>
                               <m:ctrlPr>
                                 <a:rPr lang="en-US" sz="2800" i="1">
-                                  <a:latin typeface="Cambria Math" panose="02040503050406030204" pitchFamily="18" charset="0"/>
+                                  <a:latin typeface="Cambria Math"/>
                                 </a:rPr>
                               </m:ctrlPr>
                             </m:dPr>
@@ -4181,7 +4198,7 @@
                                 <m:sSupPr>
                                   <m:ctrlPr>
                                     <a:rPr lang="en-US" sz="2800" i="1">
-                                      <a:latin typeface="Cambria Math" panose="02040503050406030204" pitchFamily="18" charset="0"/>
+                                      <a:latin typeface="Cambria Math"/>
                                     </a:rPr>
                                   </m:ctrlPr>
                                 </m:sSupPr>
@@ -4216,7 +4233,7 @@
                             <m:sSupPr>
                               <m:ctrlPr>
                                 <a:rPr lang="en-US" sz="2800" i="1">
-                                  <a:latin typeface="Cambria Math" panose="02040503050406030204" pitchFamily="18" charset="0"/>
+                                  <a:latin typeface="Cambria Math"/>
                                 </a:rPr>
                               </m:ctrlPr>
                             </m:sSupPr>
@@ -4333,7 +4350,7 @@
                         <m:dPr>
                           <m:ctrlPr>
                             <a:rPr lang="en-US" sz="2800" b="0" i="1" smtClean="0">
-                              <a:latin typeface="Cambria Math" panose="02040503050406030204" pitchFamily="18" charset="0"/>
+                              <a:latin typeface="Cambria Math"/>
                             </a:rPr>
                           </m:ctrlPr>
                         </m:dPr>
@@ -4356,7 +4373,7 @@
                         <m:fPr>
                           <m:ctrlPr>
                             <a:rPr lang="en-US" sz="2800" b="0" i="1" smtClean="0">
-                              <a:latin typeface="Cambria Math" panose="02040503050406030204" pitchFamily="18" charset="0"/>
+                              <a:latin typeface="Cambria Math"/>
                             </a:rPr>
                           </m:ctrlPr>
                         </m:fPr>
@@ -4379,7 +4396,7 @@
                             <m:sSupPr>
                               <m:ctrlPr>
                                 <a:rPr lang="en-US" sz="2800" i="1">
-                                  <a:latin typeface="Cambria Math" panose="02040503050406030204" pitchFamily="18" charset="0"/>
+                                  <a:latin typeface="Cambria Math"/>
                                 </a:rPr>
                               </m:ctrlPr>
                             </m:sSupPr>
@@ -4410,7 +4427,7 @@
                             <m:sSupPr>
                               <m:ctrlPr>
                                 <a:rPr lang="en-US" sz="2800" i="1">
-                                  <a:latin typeface="Cambria Math" panose="02040503050406030204" pitchFamily="18" charset="0"/>
+                                  <a:latin typeface="Cambria Math"/>
                                 </a:rPr>
                               </m:ctrlPr>
                             </m:sSupPr>
@@ -4449,7 +4466,7 @@
                         <m:fPr>
                           <m:ctrlPr>
                             <a:rPr lang="en-US" sz="2800" b="0" i="1" smtClean="0">
-                              <a:latin typeface="Cambria Math" panose="02040503050406030204" pitchFamily="18" charset="0"/>
+                              <a:latin typeface="Cambria Math"/>
                             </a:rPr>
                           </m:ctrlPr>
                         </m:fPr>
@@ -4470,7 +4487,7 @@
                             <m:dPr>
                               <m:ctrlPr>
                                 <a:rPr lang="en-US" sz="2800" i="1">
-                                  <a:latin typeface="Cambria Math" panose="02040503050406030204" pitchFamily="18" charset="0"/>
+                                  <a:latin typeface="Cambria Math"/>
                                 </a:rPr>
                               </m:ctrlPr>
                             </m:dPr>
@@ -4479,7 +4496,7 @@
                                 <m:sSupPr>
                                   <m:ctrlPr>
                                     <a:rPr lang="en-US" sz="2800" i="1">
-                                      <a:latin typeface="Cambria Math" panose="02040503050406030204" pitchFamily="18" charset="0"/>
+                                      <a:latin typeface="Cambria Math"/>
                                     </a:rPr>
                                   </m:ctrlPr>
                                 </m:sSupPr>
@@ -4514,7 +4531,7 @@
                             <m:sSupPr>
                               <m:ctrlPr>
                                 <a:rPr lang="en-US" sz="2800" i="1">
-                                  <a:latin typeface="Cambria Math" panose="02040503050406030204" pitchFamily="18" charset="0"/>
+                                  <a:latin typeface="Cambria Math"/>
                                 </a:rPr>
                               </m:ctrlPr>
                             </m:sSupPr>
@@ -4545,7 +4562,7 @@
                             <m:sSupPr>
                               <m:ctrlPr>
                                 <a:rPr lang="en-US" sz="2800" i="1">
-                                  <a:latin typeface="Cambria Math" panose="02040503050406030204" pitchFamily="18" charset="0"/>
+                                  <a:latin typeface="Cambria Math"/>
                                 </a:rPr>
                               </m:ctrlPr>
                             </m:sSupPr>
@@ -4658,7 +4675,7 @@
                       <m:dPr>
                         <m:ctrlPr>
                           <a:rPr lang="en-US" sz="3200" b="0" i="1" smtClean="0">
-                            <a:latin typeface="Cambria Math" panose="02040503050406030204" pitchFamily="18" charset="0"/>
+                            <a:latin typeface="Cambria Math"/>
                           </a:rPr>
                         </m:ctrlPr>
                       </m:dPr>
@@ -4681,7 +4698,7 @@
                       <m:funcPr>
                         <m:ctrlPr>
                           <a:rPr lang="en-US" sz="3200" b="0" i="1" smtClean="0">
-                            <a:latin typeface="Cambria Math" panose="02040503050406030204" pitchFamily="18" charset="0"/>
+                            <a:latin typeface="Cambria Math"/>
                           </a:rPr>
                         </m:ctrlPr>
                       </m:funcPr>
@@ -4701,7 +4718,7 @@
                           <m:dPr>
                             <m:ctrlPr>
                               <a:rPr lang="en-US" sz="3200" b="0" i="1" smtClean="0">
-                                <a:latin typeface="Cambria Math" panose="02040503050406030204" pitchFamily="18" charset="0"/>
+                                <a:latin typeface="Cambria Math"/>
                               </a:rPr>
                             </m:ctrlPr>
                           </m:dPr>
@@ -4756,7 +4773,7 @@
                       <m:dPr>
                         <m:ctrlPr>
                           <a:rPr lang="en-US" sz="3200" i="1">
-                            <a:latin typeface="Cambria Math" panose="02040503050406030204" pitchFamily="18" charset="0"/>
+                            <a:latin typeface="Cambria Math"/>
                           </a:rPr>
                         </m:ctrlPr>
                       </m:dPr>
@@ -4765,7 +4782,7 @@
                           <m:sSupPr>
                             <m:ctrlPr>
                               <a:rPr lang="en-US" sz="3200" i="1">
-                                <a:latin typeface="Cambria Math" panose="02040503050406030204" pitchFamily="18" charset="0"/>
+                                <a:latin typeface="Cambria Math"/>
                               </a:rPr>
                             </m:ctrlPr>
                           </m:sSupPr>
@@ -4792,7 +4809,7 @@
                       <m:funcPr>
                         <m:ctrlPr>
                           <a:rPr lang="en-US" sz="3200" b="0" i="1" smtClean="0">
-                            <a:latin typeface="Cambria Math" panose="02040503050406030204" pitchFamily="18" charset="0"/>
+                            <a:latin typeface="Cambria Math"/>
                           </a:rPr>
                         </m:ctrlPr>
                       </m:funcPr>
@@ -4812,7 +4829,7 @@
                           <m:dPr>
                             <m:ctrlPr>
                               <a:rPr lang="en-US" sz="3200" b="0" i="1" smtClean="0">
-                                <a:latin typeface="Cambria Math" panose="02040503050406030204" pitchFamily="18" charset="0"/>
+                                <a:latin typeface="Cambria Math"/>
                               </a:rPr>
                             </m:ctrlPr>
                           </m:dPr>
@@ -5186,7 +5203,7 @@
                           <m:dPr>
                             <m:ctrlPr>
                               <a:rPr lang="en-US" sz="2400" i="1">
-                                <a:latin typeface="Cambria Math" panose="02040503050406030204" pitchFamily="18" charset="0"/>
+                                <a:latin typeface="Cambria Math"/>
                               </a:rPr>
                             </m:ctrlPr>
                           </m:dPr>
@@ -6215,7 +6232,7 @@
                           <m:dPr>
                             <m:ctrlPr>
                               <a:rPr lang="en-US" sz="2400" i="1">
-                                <a:latin typeface="Cambria Math" panose="02040503050406030204" pitchFamily="18" charset="0"/>
+                                <a:latin typeface="Cambria Math"/>
                               </a:rPr>
                             </m:ctrlPr>
                           </m:dPr>
@@ -6891,7 +6908,7 @@
                           <m:endChr m:val="]"/>
                           <m:ctrlPr>
                             <a:rPr lang="en-US" sz="3000" i="1" smtClean="0">
-                              <a:latin typeface="Cambria Math" panose="02040503050406030204" pitchFamily="18" charset="0"/>
+                              <a:latin typeface="Cambria Math"/>
                             </a:rPr>
                           </m:ctrlPr>
                         </m:dPr>
@@ -6906,7 +6923,7 @@
                             <m:dPr>
                               <m:ctrlPr>
                                 <a:rPr lang="en-US" sz="3000" i="1" smtClean="0">
-                                  <a:latin typeface="Cambria Math" panose="02040503050406030204" pitchFamily="18" charset="0"/>
+                                  <a:latin typeface="Cambria Math"/>
                                 </a:rPr>
                               </m:ctrlPr>
                             </m:dPr>
@@ -6931,7 +6948,7 @@
                         <m:fPr>
                           <m:ctrlPr>
                             <a:rPr lang="en-US" sz="3000" i="1" smtClean="0">
-                              <a:latin typeface="Cambria Math" panose="02040503050406030204" pitchFamily="18" charset="0"/>
+                              <a:latin typeface="Cambria Math"/>
                             </a:rPr>
                           </m:ctrlPr>
                         </m:fPr>
@@ -6962,7 +6979,7 @@
                         <m:sSupPr>
                           <m:ctrlPr>
                             <a:rPr lang="en-US" sz="3000" i="1">
-                              <a:latin typeface="Cambria Math" panose="02040503050406030204" pitchFamily="18" charset="0"/>
+                              <a:latin typeface="Cambria Math"/>
                             </a:rPr>
                           </m:ctrlPr>
                         </m:sSupPr>
@@ -7005,7 +7022,7 @@
                         <m:sSupPr>
                           <m:ctrlPr>
                             <a:rPr lang="en-US" sz="3000" i="1">
-                              <a:latin typeface="Cambria Math" panose="02040503050406030204" pitchFamily="18" charset="0"/>
+                              <a:latin typeface="Cambria Math"/>
                             </a:rPr>
                           </m:ctrlPr>
                         </m:sSupPr>
@@ -7174,7 +7191,7 @@
                             <a:solidFill>
                               <a:srgbClr val="0000FF"/>
                             </a:solidFill>
-                            <a:latin typeface="Cambria Math" panose="02040503050406030204" pitchFamily="18" charset="0"/>
+                            <a:latin typeface="Cambria Math"/>
                           </a:rPr>
                         </m:ctrlPr>
                       </m:naryPr>
@@ -7186,7 +7203,7 @@
                                 <a:solidFill>
                                   <a:srgbClr val="0000FF"/>
                                 </a:solidFill>
-                                <a:latin typeface="Cambria Math" panose="02040503050406030204" pitchFamily="18" charset="0"/>
+                                <a:latin typeface="Cambria Math"/>
                               </a:rPr>
                             </m:ctrlPr>
                           </m:sSupPr>
@@ -7243,7 +7260,7 @@
                                 <a:solidFill>
                                   <a:srgbClr val="0000FF"/>
                                 </a:solidFill>
-                                <a:latin typeface="Cambria Math" panose="02040503050406030204" pitchFamily="18" charset="0"/>
+                                <a:latin typeface="Cambria Math"/>
                               </a:rPr>
                             </m:ctrlPr>
                           </m:dPr>
@@ -7366,7 +7383,7 @@
                           <m:endChr m:val="]"/>
                           <m:ctrlPr>
                             <a:rPr lang="en-US" sz="2400" b="1" i="1">
-                              <a:latin typeface="Cambria Math" panose="02040503050406030204" pitchFamily="18" charset="0"/>
+                              <a:latin typeface="Cambria Math"/>
                             </a:rPr>
                           </m:ctrlPr>
                         </m:dPr>
@@ -7381,7 +7398,7 @@
                             <m:dPr>
                               <m:ctrlPr>
                                 <a:rPr lang="en-US" sz="2400" b="1" i="1">
-                                  <a:latin typeface="Cambria Math" panose="02040503050406030204" pitchFamily="18" charset="0"/>
+                                  <a:latin typeface="Cambria Math"/>
                                 </a:rPr>
                               </m:ctrlPr>
                             </m:dPr>
@@ -7414,7 +7431,7 @@
                           <m:endChr m:val="]"/>
                           <m:ctrlPr>
                             <a:rPr lang="en-US" sz="2400" b="1" i="1" smtClean="0">
-                              <a:latin typeface="Cambria Math" panose="02040503050406030204" pitchFamily="18" charset="0"/>
+                              <a:latin typeface="Cambria Math"/>
                             </a:rPr>
                           </m:ctrlPr>
                         </m:dPr>
@@ -7424,7 +7441,7 @@
                               <m:limLoc m:val="undOvr"/>
                               <m:ctrlPr>
                                 <a:rPr lang="en-US" sz="2400" b="1" i="1">
-                                  <a:latin typeface="Cambria Math" panose="02040503050406030204" pitchFamily="18" charset="0"/>
+                                  <a:latin typeface="Cambria Math"/>
                                 </a:rPr>
                               </m:ctrlPr>
                             </m:naryPr>
@@ -7433,7 +7450,7 @@
                                 <m:sSupPr>
                                   <m:ctrlPr>
                                     <a:rPr lang="en-US" sz="2400" b="1" i="1">
-                                      <a:latin typeface="Cambria Math" panose="02040503050406030204" pitchFamily="18" charset="0"/>
+                                      <a:latin typeface="Cambria Math"/>
                                     </a:rPr>
                                   </m:ctrlPr>
                                 </m:sSupPr>
@@ -7475,7 +7492,7 @@
                                 <m:dPr>
                                   <m:ctrlPr>
                                     <a:rPr lang="en-US" sz="2400" b="1" i="1">
-                                      <a:latin typeface="Cambria Math" panose="02040503050406030204" pitchFamily="18" charset="0"/>
+                                      <a:latin typeface="Cambria Math"/>
                                     </a:rPr>
                                   </m:ctrlPr>
                                 </m:dPr>
@@ -7508,7 +7525,7 @@
                         <m:fPr>
                           <m:ctrlPr>
                             <a:rPr lang="en-US" sz="2400" b="1" i="1">
-                              <a:latin typeface="Cambria Math" panose="02040503050406030204" pitchFamily="18" charset="0"/>
+                              <a:latin typeface="Cambria Math"/>
                             </a:rPr>
                           </m:ctrlPr>
                         </m:fPr>
@@ -7541,7 +7558,7 @@
                           <m:endChr m:val="]"/>
                           <m:ctrlPr>
                             <a:rPr lang="en-US" sz="2400" b="1" i="1" smtClean="0">
-                              <a:latin typeface="Cambria Math" panose="02040503050406030204" pitchFamily="18" charset="0"/>
+                              <a:latin typeface="Cambria Math"/>
                             </a:rPr>
                           </m:ctrlPr>
                         </m:dPr>
@@ -7556,7 +7573,7 @@
                             <m:dPr>
                               <m:ctrlPr>
                                 <a:rPr lang="en-US" sz="2400" b="1" i="1" smtClean="0">
-                                  <a:latin typeface="Cambria Math" panose="02040503050406030204" pitchFamily="18" charset="0"/>
+                                  <a:latin typeface="Cambria Math"/>
                                 </a:rPr>
                               </m:ctrlPr>
                             </m:dPr>
@@ -7581,7 +7598,7 @@
                         <m:fPr>
                           <m:ctrlPr>
                             <a:rPr lang="en-US" sz="2400" b="1" i="1" smtClean="0">
-                              <a:latin typeface="Cambria Math" panose="02040503050406030204" pitchFamily="18" charset="0"/>
+                              <a:latin typeface="Cambria Math"/>
                             </a:rPr>
                           </m:ctrlPr>
                         </m:fPr>
@@ -7598,7 +7615,7 @@
                             <m:sSupPr>
                               <m:ctrlPr>
                                 <a:rPr lang="en-US" sz="2400" b="1" i="1">
-                                  <a:latin typeface="Cambria Math" panose="02040503050406030204" pitchFamily="18" charset="0"/>
+                                  <a:latin typeface="Cambria Math"/>
                                 </a:rPr>
                               </m:ctrlPr>
                             </m:sSupPr>
@@ -7643,7 +7660,7 @@
                         <m:sSupPr>
                           <m:ctrlPr>
                             <a:rPr lang="en-US" sz="2400" b="1" i="1">
-                              <a:latin typeface="Cambria Math" panose="02040503050406030204" pitchFamily="18" charset="0"/>
+                              <a:latin typeface="Cambria Math"/>
                             </a:rPr>
                           </m:ctrlPr>
                         </m:sSupPr>
@@ -7686,7 +7703,7 @@
                         <m:sSupPr>
                           <m:ctrlPr>
                             <a:rPr lang="en-US" sz="2400" b="1" i="1">
-                              <a:latin typeface="Cambria Math" panose="02040503050406030204" pitchFamily="18" charset="0"/>
+                              <a:latin typeface="Cambria Math"/>
                             </a:rPr>
                           </m:ctrlPr>
                         </m:sSupPr>
@@ -9527,7 +9544,7 @@
                         <m:sSubPr>
                           <m:ctrlPr>
                             <a:rPr lang="en-US" sz="2800" i="1" smtClean="0">
-                              <a:latin typeface="Cambria Math" panose="02040503050406030204" pitchFamily="18" charset="0"/>
+                              <a:latin typeface="Cambria Math"/>
                             </a:rPr>
                           </m:ctrlPr>
                         </m:sSubPr>
@@ -9558,7 +9575,7 @@
                         <m:sSubPr>
                           <m:ctrlPr>
                             <a:rPr lang="en-US" sz="2800" i="1" smtClean="0">
-                              <a:latin typeface="Cambria Math" panose="02040503050406030204" pitchFamily="18" charset="0"/>
+                              <a:latin typeface="Cambria Math"/>
                             </a:rPr>
                           </m:ctrlPr>
                         </m:sSubPr>
@@ -9589,7 +9606,7 @@
                         <m:sSubPr>
                           <m:ctrlPr>
                             <a:rPr lang="en-US" sz="2800" b="0" i="1" smtClean="0">
-                              <a:latin typeface="Cambria Math" panose="02040503050406030204" pitchFamily="18" charset="0"/>
+                              <a:latin typeface="Cambria Math"/>
                             </a:rPr>
                           </m:ctrlPr>
                         </m:sSubPr>
@@ -9620,7 +9637,7 @@
                         <m:sSubPr>
                           <m:ctrlPr>
                             <a:rPr lang="en-US" sz="2800" b="0" i="1" smtClean="0">
-                              <a:latin typeface="Cambria Math" panose="02040503050406030204" pitchFamily="18" charset="0"/>
+                              <a:latin typeface="Cambria Math"/>
                             </a:rPr>
                           </m:ctrlPr>
                         </m:sSubPr>
@@ -9723,7 +9740,7 @@
                         <m:sSubPr>
                           <m:ctrlPr>
                             <a:rPr lang="en-US" sz="2800" i="1" smtClean="0">
-                              <a:latin typeface="Cambria Math" panose="02040503050406030204" pitchFamily="18" charset="0"/>
+                              <a:latin typeface="Cambria Math"/>
                             </a:rPr>
                           </m:ctrlPr>
                         </m:sSubPr>
@@ -9772,7 +9789,7 @@
                         <m:dPr>
                           <m:ctrlPr>
                             <a:rPr lang="en-US" sz="2800" b="0" i="1" smtClean="0">
-                              <a:latin typeface="Cambria Math" panose="02040503050406030204" pitchFamily="18" charset="0"/>
+                              <a:latin typeface="Cambria Math"/>
                             </a:rPr>
                           </m:ctrlPr>
                         </m:dPr>
@@ -9807,7 +9824,7 @@
                         <m:fPr>
                           <m:ctrlPr>
                             <a:rPr lang="en-US" sz="2800" b="0" i="1" smtClean="0">
-                              <a:latin typeface="Cambria Math" panose="02040503050406030204" pitchFamily="18" charset="0"/>
+                              <a:latin typeface="Cambria Math"/>
                             </a:rPr>
                           </m:ctrlPr>
                         </m:fPr>
@@ -9856,7 +9873,7 @@
                         <m:fPr>
                           <m:ctrlPr>
                             <a:rPr lang="en-US" sz="2800" b="0" i="1" smtClean="0">
-                              <a:latin typeface="Cambria Math" panose="02040503050406030204" pitchFamily="18" charset="0"/>
+                              <a:latin typeface="Cambria Math"/>
                             </a:rPr>
                           </m:ctrlPr>
                         </m:fPr>
@@ -9882,7 +9899,7 @@
                           <m:limLoc m:val="undOvr"/>
                           <m:ctrlPr>
                             <a:rPr lang="en-US" sz="2800" b="0" i="1" smtClean="0">
-                              <a:latin typeface="Cambria Math" panose="02040503050406030204" pitchFamily="18" charset="0"/>
+                              <a:latin typeface="Cambria Math"/>
                             </a:rPr>
                           </m:ctrlPr>
                         </m:naryPr>
@@ -9923,7 +9940,7 @@
                             <m:dPr>
                               <m:ctrlPr>
                                 <a:rPr lang="en-US" sz="2800" b="0" i="1" smtClean="0">
-                                  <a:latin typeface="Cambria Math" panose="02040503050406030204" pitchFamily="18" charset="0"/>
+                                  <a:latin typeface="Cambria Math"/>
                                 </a:rPr>
                               </m:ctrlPr>
                             </m:dPr>
@@ -10077,7 +10094,7 @@
                               <a:solidFill>
                                 <a:srgbClr val="7030A0"/>
                               </a:solidFill>
-                              <a:latin typeface="Cambria Math" panose="02040503050406030204" pitchFamily="18" charset="0"/>
+                              <a:latin typeface="Cambria Math"/>
                             </a:rPr>
                           </m:ctrlPr>
                         </m:dPr>
@@ -10109,7 +10126,7 @@
                               <a:solidFill>
                                 <a:srgbClr val="7030A0"/>
                               </a:solidFill>
-                              <a:latin typeface="Cambria Math" panose="02040503050406030204" pitchFamily="18" charset="0"/>
+                              <a:latin typeface="Cambria Math"/>
                             </a:rPr>
                           </m:ctrlPr>
                         </m:fPr>
@@ -10179,7 +10196,7 @@
                               <a:solidFill>
                                 <a:srgbClr val="7030A0"/>
                               </a:solidFill>
-                              <a:latin typeface="Cambria Math" panose="02040503050406030204" pitchFamily="18" charset="0"/>
+                              <a:latin typeface="Cambria Math"/>
                             </a:rPr>
                           </m:ctrlPr>
                         </m:fPr>
@@ -10214,7 +10231,7 @@
                               <a:solidFill>
                                 <a:srgbClr val="7030A0"/>
                               </a:solidFill>
-                              <a:latin typeface="Cambria Math" panose="02040503050406030204" pitchFamily="18" charset="0"/>
+                              <a:latin typeface="Cambria Math"/>
                             </a:rPr>
                           </m:ctrlPr>
                         </m:naryPr>
@@ -10270,7 +10287,7 @@
                                   <a:solidFill>
                                     <a:srgbClr val="7030A0"/>
                                   </a:solidFill>
-                                  <a:latin typeface="Cambria Math" panose="02040503050406030204" pitchFamily="18" charset="0"/>
+                                  <a:latin typeface="Cambria Math"/>
                                 </a:rPr>
                               </m:ctrlPr>
                             </m:dPr>
@@ -10353,7 +10370,7 @@
           <p:cNvPr id="7" name="TextBox 6">
             <a:extLst>
               <a:ext uri="{FF2B5EF4-FFF2-40B4-BE49-F238E27FC236}">
-                <a16:creationId xmlns:a16="http://schemas.microsoft.com/office/drawing/2014/main" id="{6D60894F-25DF-DF61-24C7-C65D45174820}"/>
+                <a16:creationId xmlns:a16="http://schemas.microsoft.com/office/drawing/2014/main" xmlns="" id="{6D60894F-25DF-DF61-24C7-C65D45174820}"/>
               </a:ext>
             </a:extLst>
           </p:cNvPr>
@@ -10544,7 +10561,7 @@
                         <m:dPr>
                           <m:ctrlPr>
                             <a:rPr lang="en-US" sz="2800" b="0" i="1" smtClean="0">
-                              <a:latin typeface="Cambria Math" panose="02040503050406030204" pitchFamily="18" charset="0"/>
+                              <a:latin typeface="Cambria Math"/>
                             </a:rPr>
                           </m:ctrlPr>
                         </m:dPr>
@@ -10573,7 +10590,7 @@
                         <m:dPr>
                           <m:ctrlPr>
                             <a:rPr lang="en-US" sz="2800" b="0" i="1" smtClean="0">
-                              <a:latin typeface="Cambria Math" panose="02040503050406030204" pitchFamily="18" charset="0"/>
+                              <a:latin typeface="Cambria Math"/>
                             </a:rPr>
                           </m:ctrlPr>
                         </m:dPr>
@@ -10602,7 +10619,7 @@
                         <m:dPr>
                           <m:ctrlPr>
                             <a:rPr lang="en-US" sz="2800" b="0" i="1" smtClean="0">
-                              <a:latin typeface="Cambria Math" panose="02040503050406030204" pitchFamily="18" charset="0"/>
+                              <a:latin typeface="Cambria Math"/>
                             </a:rPr>
                           </m:ctrlPr>
                         </m:dPr>
@@ -10611,7 +10628,7 @@
                             <m:sSupPr>
                               <m:ctrlPr>
                                 <a:rPr lang="en-US" sz="2800" b="0" i="1" smtClean="0">
-                                  <a:latin typeface="Cambria Math" panose="02040503050406030204" pitchFamily="18" charset="0"/>
+                                  <a:latin typeface="Cambria Math"/>
                                 </a:rPr>
                               </m:ctrlPr>
                             </m:sSupPr>
@@ -10644,7 +10661,7 @@
                         <m:fPr>
                           <m:ctrlPr>
                             <a:rPr lang="en-US" sz="2800" b="0" i="1" smtClean="0">
-                              <a:latin typeface="Cambria Math" panose="02040503050406030204" pitchFamily="18" charset="0"/>
+                              <a:latin typeface="Cambria Math"/>
                             </a:rPr>
                           </m:ctrlPr>
                         </m:fPr>
@@ -10693,7 +10710,7 @@
                         <m:fPr>
                           <m:ctrlPr>
                             <a:rPr lang="en-US" sz="2800" b="0" i="1" smtClean="0">
-                              <a:latin typeface="Cambria Math" panose="02040503050406030204" pitchFamily="18" charset="0"/>
+                              <a:latin typeface="Cambria Math"/>
                             </a:rPr>
                           </m:ctrlPr>
                         </m:fPr>
@@ -10702,7 +10719,7 @@
                             <m:sSubPr>
                               <m:ctrlPr>
                                 <a:rPr lang="en-US" sz="2800" b="0" i="1" smtClean="0">
-                                  <a:latin typeface="Cambria Math" panose="02040503050406030204" pitchFamily="18" charset="0"/>
+                                  <a:latin typeface="Cambria Math"/>
                                 </a:rPr>
                               </m:ctrlPr>
                             </m:sSubPr>
@@ -10733,7 +10750,7 @@
                             <m:sSupPr>
                               <m:ctrlPr>
                                 <a:rPr lang="en-US" sz="2800" b="0" i="1" smtClean="0">
-                                  <a:latin typeface="Cambria Math" panose="02040503050406030204" pitchFamily="18" charset="0"/>
+                                  <a:latin typeface="Cambria Math"/>
                                 </a:rPr>
                               </m:ctrlPr>
                             </m:sSupPr>
@@ -10887,7 +10904,7 @@
                       <m:dPr>
                         <m:ctrlPr>
                           <a:rPr lang="en-US" sz="3200" b="0" i="1" smtClean="0">
-                            <a:latin typeface="Cambria Math" panose="02040503050406030204" pitchFamily="18" charset="0"/>
+                            <a:latin typeface="Cambria Math"/>
                             <a:ea typeface="Cambria Math" panose="02040503050406030204" pitchFamily="18" charset="0"/>
                           </a:rPr>
                         </m:ctrlPr>
@@ -10924,7 +10941,7 @@
                       <m:fPr>
                         <m:ctrlPr>
                           <a:rPr lang="en-US" sz="3200" i="1" smtClean="0">
-                            <a:latin typeface="Cambria Math" panose="02040503050406030204" pitchFamily="18" charset="0"/>
+                            <a:latin typeface="Cambria Math"/>
                             <a:ea typeface="Cambria Math" panose="02040503050406030204" pitchFamily="18" charset="0"/>
                           </a:rPr>
                         </m:ctrlPr>
@@ -10978,7 +10995,7 @@
                           <m:sSupPr>
                             <m:ctrlPr>
                               <a:rPr lang="en-US" sz="3200" i="1">
-                                <a:latin typeface="Cambria Math" panose="02040503050406030204" pitchFamily="18" charset="0"/>
+                                <a:latin typeface="Cambria Math"/>
                                 <a:ea typeface="Cambria Math" panose="02040503050406030204" pitchFamily="18" charset="0"/>
                               </a:rPr>
                             </m:ctrlPr>
@@ -11026,7 +11043,7 @@
                       <m:fPr>
                         <m:ctrlPr>
                           <a:rPr lang="en-US" sz="3200" i="1" smtClean="0">
-                            <a:latin typeface="Cambria Math" panose="02040503050406030204" pitchFamily="18" charset="0"/>
+                            <a:latin typeface="Cambria Math"/>
                             <a:ea typeface="Cambria Math" panose="02040503050406030204" pitchFamily="18" charset="0"/>
                           </a:rPr>
                         </m:ctrlPr>
@@ -11059,7 +11076,7 @@
                           <m:sSupPr>
                             <m:ctrlPr>
                               <a:rPr lang="en-US" sz="3200" i="1" smtClean="0">
-                                <a:latin typeface="Cambria Math" panose="02040503050406030204" pitchFamily="18" charset="0"/>
+                                <a:latin typeface="Cambria Math"/>
                                 <a:ea typeface="Cambria Math" panose="02040503050406030204" pitchFamily="18" charset="0"/>
                               </a:rPr>
                             </m:ctrlPr>
@@ -11114,7 +11131,7 @@
                       <m:fPr>
                         <m:ctrlPr>
                           <a:rPr lang="en-US" sz="3200" i="1" smtClean="0">
-                            <a:latin typeface="Cambria Math" panose="02040503050406030204" pitchFamily="18" charset="0"/>
+                            <a:latin typeface="Cambria Math"/>
                             <a:ea typeface="Cambria Math" panose="02040503050406030204" pitchFamily="18" charset="0"/>
                           </a:rPr>
                         </m:ctrlPr>
@@ -11163,7 +11180,7 @@
                       <m:fPr>
                         <m:ctrlPr>
                           <a:rPr lang="en-US" sz="3200" b="0" i="1" smtClean="0">
-                            <a:latin typeface="Cambria Math" panose="02040503050406030204" pitchFamily="18" charset="0"/>
+                            <a:latin typeface="Cambria Math"/>
                             <a:ea typeface="Cambria Math" panose="02040503050406030204" pitchFamily="18" charset="0"/>
                           </a:rPr>
                         </m:ctrlPr>
@@ -11182,7 +11199,7 @@
                           <m:sSupPr>
                             <m:ctrlPr>
                               <a:rPr lang="en-US" sz="3200" b="0" i="1" smtClean="0">
-                                <a:latin typeface="Cambria Math" panose="02040503050406030204" pitchFamily="18" charset="0"/>
+                                <a:latin typeface="Cambria Math"/>
                                 <a:ea typeface="Cambria Math" panose="02040503050406030204" pitchFamily="18" charset="0"/>
                               </a:rPr>
                             </m:ctrlPr>
@@ -11351,7 +11368,7 @@
                         <m:dPr>
                           <m:ctrlPr>
                             <a:rPr lang="en-US" sz="3600" b="0" i="1" smtClean="0">
-                              <a:latin typeface="Cambria Math" panose="02040503050406030204" pitchFamily="18" charset="0"/>
+                              <a:latin typeface="Cambria Math"/>
                               <a:ea typeface="Cambria Math" panose="02040503050406030204" pitchFamily="18" charset="0"/>
                             </a:rPr>
                           </m:ctrlPr>
@@ -11377,7 +11394,7 @@
                         <m:sSupPr>
                           <m:ctrlPr>
                             <a:rPr lang="en-US" sz="3600" b="0" i="1" smtClean="0">
-                              <a:latin typeface="Cambria Math" panose="02040503050406030204" pitchFamily="18" charset="0"/>
+                              <a:latin typeface="Cambria Math"/>
                               <a:ea typeface="Cambria Math" panose="02040503050406030204" pitchFamily="18" charset="0"/>
                             </a:rPr>
                           </m:ctrlPr>
@@ -11419,7 +11436,7 @@
                         <m:dPr>
                           <m:ctrlPr>
                             <a:rPr lang="en-US" sz="3600" b="0" i="1" smtClean="0">
-                              <a:latin typeface="Cambria Math" panose="02040503050406030204" pitchFamily="18" charset="0"/>
+                              <a:latin typeface="Cambria Math"/>
                               <a:ea typeface="Cambria Math" panose="02040503050406030204" pitchFamily="18" charset="0"/>
                             </a:rPr>
                           </m:ctrlPr>
@@ -11452,7 +11469,7 @@
                         <m:sSupPr>
                           <m:ctrlPr>
                             <a:rPr lang="en-US" sz="3600" i="1">
-                              <a:latin typeface="Cambria Math" panose="02040503050406030204" pitchFamily="18" charset="0"/>
+                              <a:latin typeface="Cambria Math"/>
                               <a:ea typeface="Cambria Math" panose="02040503050406030204" pitchFamily="18" charset="0"/>
                             </a:rPr>
                           </m:ctrlPr>
@@ -11494,7 +11511,7 @@
                         <m:dPr>
                           <m:ctrlPr>
                             <a:rPr lang="en-US" sz="3600" b="0" i="1" smtClean="0">
-                              <a:latin typeface="Cambria Math" panose="02040503050406030204" pitchFamily="18" charset="0"/>
+                              <a:latin typeface="Cambria Math"/>
                               <a:ea typeface="Cambria Math" panose="02040503050406030204" pitchFamily="18" charset="0"/>
                             </a:rPr>
                           </m:ctrlPr>
@@ -11613,7 +11630,7 @@
               <p:cNvPr id="3" name="TextBox 2">
                 <a:extLst>
                   <a:ext uri="{FF2B5EF4-FFF2-40B4-BE49-F238E27FC236}">
-                    <a16:creationId xmlns:a16="http://schemas.microsoft.com/office/drawing/2014/main" id="{E627E0A0-AB06-CE86-E67E-50DF895A2277}"/>
+                    <a16:creationId xmlns:a16="http://schemas.microsoft.com/office/drawing/2014/main" xmlns="" id="{E627E0A0-AB06-CE86-E67E-50DF895A2277}"/>
                   </a:ext>
                 </a:extLst>
               </p:cNvPr>
@@ -11659,7 +11676,7 @@
                         <m:fPr>
                           <m:ctrlPr>
                             <a:rPr lang="en-GB" sz="1800" b="0" i="1" smtClean="0">
-                              <a:latin typeface="Cambria Math" panose="02040503050406030204" pitchFamily="18" charset="0"/>
+                              <a:latin typeface="Cambria Math"/>
                             </a:rPr>
                           </m:ctrlPr>
                         </m:fPr>
@@ -11696,7 +11713,7 @@
                         <m:dPr>
                           <m:ctrlPr>
                             <a:rPr lang="en-US" i="1">
-                              <a:latin typeface="Cambria Math" panose="02040503050406030204" pitchFamily="18" charset="0"/>
+                              <a:latin typeface="Cambria Math"/>
                             </a:rPr>
                           </m:ctrlPr>
                         </m:dPr>
@@ -11743,7 +11760,7 @@
                         <m:fPr>
                           <m:ctrlPr>
                             <a:rPr lang="en-US" sz="1800" b="0" i="1" smtClean="0">
-                              <a:latin typeface="Cambria Math" panose="02040503050406030204" pitchFamily="18" charset="0"/>
+                              <a:latin typeface="Cambria Math"/>
                             </a:rPr>
                           </m:ctrlPr>
                         </m:fPr>
@@ -11830,7 +11847,7 @@
               <p:cNvPr id="4" name="TextBox 3">
                 <a:extLst>
                   <a:ext uri="{FF2B5EF4-FFF2-40B4-BE49-F238E27FC236}">
-                    <a16:creationId xmlns:a16="http://schemas.microsoft.com/office/drawing/2014/main" id="{593BFCA2-AA1C-A75C-F612-8D46C79683FC}"/>
+                    <a16:creationId xmlns:a16="http://schemas.microsoft.com/office/drawing/2014/main" xmlns="" id="{593BFCA2-AA1C-A75C-F612-8D46C79683FC}"/>
                   </a:ext>
                 </a:extLst>
               </p:cNvPr>
@@ -11864,7 +11881,7 @@
                         <m:fPr>
                           <m:ctrlPr>
                             <a:rPr lang="en-GB" sz="1800" b="0" i="1" smtClean="0">
-                              <a:latin typeface="Cambria Math" panose="02040503050406030204" pitchFamily="18" charset="0"/>
+                              <a:latin typeface="Cambria Math"/>
                             </a:rPr>
                           </m:ctrlPr>
                         </m:fPr>
@@ -11913,7 +11930,7 @@
                         <m:dPr>
                           <m:ctrlPr>
                             <a:rPr lang="en-US" i="1">
-                              <a:latin typeface="Cambria Math" panose="02040503050406030204" pitchFamily="18" charset="0"/>
+                              <a:latin typeface="Cambria Math"/>
                             </a:rPr>
                           </m:ctrlPr>
                         </m:dPr>
@@ -11936,7 +11953,7 @@
                         <m:fPr>
                           <m:ctrlPr>
                             <a:rPr lang="en-US" sz="1800" b="0" i="1" smtClean="0">
-                              <a:latin typeface="Cambria Math" panose="02040503050406030204" pitchFamily="18" charset="0"/>
+                              <a:latin typeface="Cambria Math"/>
                             </a:rPr>
                           </m:ctrlPr>
                         </m:fPr>
@@ -11966,7 +11983,7 @@
                             <m:sSupPr>
                               <m:ctrlPr>
                                 <a:rPr lang="en-US" i="1">
-                                  <a:latin typeface="Cambria Math" panose="02040503050406030204" pitchFamily="18" charset="0"/>
+                                  <a:latin typeface="Cambria Math"/>
                                   <a:ea typeface="Cambria Math" panose="02040503050406030204" pitchFamily="18" charset="0"/>
                                 </a:rPr>
                               </m:ctrlPr>
@@ -12227,7 +12244,7 @@
           <p:cNvPr id="4" name="TextBox 3">
             <a:extLst>
               <a:ext uri="{FF2B5EF4-FFF2-40B4-BE49-F238E27FC236}">
-                <a16:creationId xmlns:a16="http://schemas.microsoft.com/office/drawing/2014/main" id="{2AD08732-DA46-CBF2-8C19-852153DE9EAB}"/>
+                <a16:creationId xmlns:a16="http://schemas.microsoft.com/office/drawing/2014/main" xmlns="" id="{2AD08732-DA46-CBF2-8C19-852153DE9EAB}"/>
               </a:ext>
             </a:extLst>
           </p:cNvPr>
@@ -12769,7 +12786,7 @@
           <p:cNvPr id="5" name="TextBox 4">
             <a:extLst>
               <a:ext uri="{FF2B5EF4-FFF2-40B4-BE49-F238E27FC236}">
-                <a16:creationId xmlns:a16="http://schemas.microsoft.com/office/drawing/2014/main" id="{57834CAD-9EBE-5BC1-BA52-6E49D41FD9CF}"/>
+                <a16:creationId xmlns:a16="http://schemas.microsoft.com/office/drawing/2014/main" xmlns="" id="{57834CAD-9EBE-5BC1-BA52-6E49D41FD9CF}"/>
               </a:ext>
             </a:extLst>
           </p:cNvPr>
@@ -12915,7 +12932,7 @@
           <p:cNvPr id="8" name="TextBox 7">
             <a:extLst>
               <a:ext uri="{FF2B5EF4-FFF2-40B4-BE49-F238E27FC236}">
-                <a16:creationId xmlns:a16="http://schemas.microsoft.com/office/drawing/2014/main" id="{1E26CE1C-C844-CC4C-2C89-9648BD73E38B}"/>
+                <a16:creationId xmlns:a16="http://schemas.microsoft.com/office/drawing/2014/main" xmlns="" id="{1E26CE1C-C844-CC4C-2C89-9648BD73E38B}"/>
               </a:ext>
             </a:extLst>
           </p:cNvPr>
@@ -12964,7 +12981,7 @@
           <p:cNvPr id="4" name="Rectangle 2">
             <a:extLst>
               <a:ext uri="{FF2B5EF4-FFF2-40B4-BE49-F238E27FC236}">
-                <a16:creationId xmlns:a16="http://schemas.microsoft.com/office/drawing/2014/main" id="{002F9D8D-7DAB-2F30-ADFC-02A57C551D68}"/>
+                <a16:creationId xmlns:a16="http://schemas.microsoft.com/office/drawing/2014/main" xmlns="" id="{002F9D8D-7DAB-2F30-ADFC-02A57C551D68}"/>
               </a:ext>
             </a:extLst>
           </p:cNvPr>
@@ -14031,7 +14048,7 @@
           <p:cNvPr id="5" name="مربع نص 1">
             <a:extLst>
               <a:ext uri="{FF2B5EF4-FFF2-40B4-BE49-F238E27FC236}">
-                <a16:creationId xmlns:a16="http://schemas.microsoft.com/office/drawing/2014/main" id="{7711DB52-DA0E-C95D-DFAF-CCC7BD2BE49D}"/>
+                <a16:creationId xmlns:a16="http://schemas.microsoft.com/office/drawing/2014/main" xmlns="" id="{7711DB52-DA0E-C95D-DFAF-CCC7BD2BE49D}"/>
               </a:ext>
             </a:extLst>
           </p:cNvPr>
@@ -14095,7 +14112,7 @@
           <p:cNvPr id="6" name="TextBox 5">
             <a:extLst>
               <a:ext uri="{FF2B5EF4-FFF2-40B4-BE49-F238E27FC236}">
-                <a16:creationId xmlns:a16="http://schemas.microsoft.com/office/drawing/2014/main" id="{34183D16-35EC-852C-6B9E-C6ED3DBFD9D3}"/>
+                <a16:creationId xmlns:a16="http://schemas.microsoft.com/office/drawing/2014/main" xmlns="" id="{34183D16-35EC-852C-6B9E-C6ED3DBFD9D3}"/>
               </a:ext>
             </a:extLst>
           </p:cNvPr>
@@ -14448,7 +14465,7 @@
           <p:cNvPr id="7" name="TextBox 6">
             <a:extLst>
               <a:ext uri="{FF2B5EF4-FFF2-40B4-BE49-F238E27FC236}">
-                <a16:creationId xmlns:a16="http://schemas.microsoft.com/office/drawing/2014/main" id="{B66F6C66-435D-19C9-753E-FB43FE2E13B8}"/>
+                <a16:creationId xmlns:a16="http://schemas.microsoft.com/office/drawing/2014/main" xmlns="" id="{B66F6C66-435D-19C9-753E-FB43FE2E13B8}"/>
               </a:ext>
             </a:extLst>
           </p:cNvPr>
@@ -14530,7 +14547,7 @@
           <p:cNvPr id="9" name="مربع نص 1">
             <a:extLst>
               <a:ext uri="{FF2B5EF4-FFF2-40B4-BE49-F238E27FC236}">
-                <a16:creationId xmlns:a16="http://schemas.microsoft.com/office/drawing/2014/main" id="{C21C7ED3-9CF9-F6A0-18E3-82DF544CCBB4}"/>
+                <a16:creationId xmlns:a16="http://schemas.microsoft.com/office/drawing/2014/main" xmlns="" id="{C21C7ED3-9CF9-F6A0-18E3-82DF544CCBB4}"/>
               </a:ext>
             </a:extLst>
           </p:cNvPr>
@@ -14736,7 +14753,7 @@
                             <a:solidFill>
                               <a:schemeClr val="tx1"/>
                             </a:solidFill>
-                            <a:latin typeface="Cambria Math" panose="02040503050406030204" pitchFamily="18" charset="0"/>
+                            <a:latin typeface="Cambria Math"/>
                             <a:ea typeface="Cambria Math" panose="02040503050406030204" pitchFamily="18" charset="0"/>
                           </a:rPr>
                         </m:ctrlPr>
@@ -14749,7 +14766,7 @@
                                 <a:solidFill>
                                   <a:schemeClr val="tx1"/>
                                 </a:solidFill>
-                                <a:latin typeface="Cambria Math" panose="02040503050406030204" pitchFamily="18" charset="0"/>
+                                <a:latin typeface="Cambria Math"/>
                                 <a:ea typeface="Cambria Math" panose="02040503050406030204" pitchFamily="18" charset="0"/>
                               </a:rPr>
                             </m:ctrlPr>
@@ -14798,7 +14815,7 @@
                                 <a:solidFill>
                                   <a:schemeClr val="tx1"/>
                                 </a:solidFill>
-                                <a:latin typeface="Cambria Math" panose="02040503050406030204" pitchFamily="18" charset="0"/>
+                                <a:latin typeface="Cambria Math"/>
                                 <a:ea typeface="Cambria Math" panose="02040503050406030204" pitchFamily="18" charset="0"/>
                               </a:rPr>
                             </m:ctrlPr>
@@ -14851,7 +14868,7 @@
                             <a:solidFill>
                               <a:schemeClr val="tx1"/>
                             </a:solidFill>
-                            <a:latin typeface="Cambria Math" panose="02040503050406030204" pitchFamily="18" charset="0"/>
+                            <a:latin typeface="Cambria Math"/>
                             <a:ea typeface="Cambria Math" panose="02040503050406030204" pitchFamily="18" charset="0"/>
                           </a:rPr>
                         </m:ctrlPr>
@@ -14909,7 +14926,7 @@
                       <m:sSupPr>
                         <m:ctrlPr>
                           <a:rPr lang="en-US" sz="2800" b="1" i="1" dirty="0">
-                            <a:latin typeface="Cambria Math" panose="02040503050406030204" pitchFamily="18" charset="0"/>
+                            <a:latin typeface="Cambria Math"/>
                             <a:ea typeface="Cambria Math" panose="02040503050406030204" pitchFamily="18" charset="0"/>
                           </a:rPr>
                         </m:ctrlPr>
@@ -14982,7 +14999,7 @@
                             <a:solidFill>
                               <a:schemeClr val="tx1"/>
                             </a:solidFill>
-                            <a:latin typeface="Cambria Math" panose="02040503050406030204" pitchFamily="18" charset="0"/>
+                            <a:latin typeface="Cambria Math"/>
                             <a:ea typeface="Cambria Math" panose="02040503050406030204" pitchFamily="18" charset="0"/>
                           </a:rPr>
                         </m:ctrlPr>
@@ -15026,7 +15043,7 @@
                       <m:sSupPr>
                         <m:ctrlPr>
                           <a:rPr lang="en-US" sz="2800" b="1" i="1" dirty="0">
-                            <a:latin typeface="Cambria Math" panose="02040503050406030204" pitchFamily="18" charset="0"/>
+                            <a:latin typeface="Cambria Math"/>
                             <a:ea typeface="Cambria Math" panose="02040503050406030204" pitchFamily="18" charset="0"/>
                           </a:rPr>
                         </m:ctrlPr>
@@ -15079,7 +15096,7 @@
                             <a:solidFill>
                               <a:schemeClr val="tx1"/>
                             </a:solidFill>
-                            <a:latin typeface="Cambria Math" panose="02040503050406030204" pitchFamily="18" charset="0"/>
+                            <a:latin typeface="Cambria Math"/>
                             <a:ea typeface="Cambria Math" panose="02040503050406030204" pitchFamily="18" charset="0"/>
                           </a:rPr>
                         </m:ctrlPr>
@@ -15111,7 +15128,7 @@
                       <m:sSupPr>
                         <m:ctrlPr>
                           <a:rPr lang="en-US" sz="2800" b="1" i="1">
-                            <a:latin typeface="Cambria Math" panose="02040503050406030204" pitchFamily="18" charset="0"/>
+                            <a:latin typeface="Cambria Math"/>
                             <a:ea typeface="Cambria Math" panose="02040503050406030204" pitchFamily="18" charset="0"/>
                           </a:rPr>
                         </m:ctrlPr>
@@ -15153,7 +15170,7 @@
                       <m:sSupPr>
                         <m:ctrlPr>
                           <a:rPr lang="en-US" sz="2800" b="1" i="1" dirty="0">
-                            <a:latin typeface="Cambria Math" panose="02040503050406030204" pitchFamily="18" charset="0"/>
+                            <a:latin typeface="Cambria Math"/>
                             <a:ea typeface="Cambria Math" panose="02040503050406030204" pitchFamily="18" charset="0"/>
                           </a:rPr>
                         </m:ctrlPr>
@@ -15219,7 +15236,7 @@
                       <m:sSupPr>
                         <m:ctrlPr>
                           <a:rPr lang="en-US" sz="2800" b="1" i="1">
-                            <a:latin typeface="Cambria Math" panose="02040503050406030204" pitchFamily="18" charset="0"/>
+                            <a:latin typeface="Cambria Math"/>
                             <a:ea typeface="Cambria Math" panose="02040503050406030204" pitchFamily="18" charset="0"/>
                           </a:rPr>
                         </m:ctrlPr>
@@ -15344,7 +15361,7 @@
                             <a:solidFill>
                               <a:schemeClr val="tx1"/>
                             </a:solidFill>
-                            <a:latin typeface="Cambria Math" panose="02040503050406030204" pitchFamily="18" charset="0"/>
+                            <a:latin typeface="Cambria Math"/>
                             <a:ea typeface="Cambria Math" panose="02040503050406030204" pitchFamily="18" charset="0"/>
                           </a:rPr>
                         </m:ctrlPr>
@@ -15357,7 +15374,7 @@
                                 <a:solidFill>
                                   <a:schemeClr val="tx1"/>
                                 </a:solidFill>
-                                <a:latin typeface="Cambria Math" panose="02040503050406030204" pitchFamily="18" charset="0"/>
+                                <a:latin typeface="Cambria Math"/>
                                 <a:ea typeface="Cambria Math" panose="02040503050406030204" pitchFamily="18" charset="0"/>
                               </a:rPr>
                             </m:ctrlPr>
@@ -15406,7 +15423,7 @@
                                 <a:solidFill>
                                   <a:schemeClr val="tx1"/>
                                 </a:solidFill>
-                                <a:latin typeface="Cambria Math" panose="02040503050406030204" pitchFamily="18" charset="0"/>
+                                <a:latin typeface="Cambria Math"/>
                                 <a:ea typeface="Cambria Math" panose="02040503050406030204" pitchFamily="18" charset="0"/>
                               </a:rPr>
                             </m:ctrlPr>
@@ -15456,7 +15473,7 @@
                       <m:sSupPr>
                         <m:ctrlPr>
                           <a:rPr lang="en-US" sz="2800" b="1" i="1" dirty="0">
-                            <a:latin typeface="Cambria Math" panose="02040503050406030204" pitchFamily="18" charset="0"/>
+                            <a:latin typeface="Cambria Math"/>
                             <a:ea typeface="Cambria Math" panose="02040503050406030204" pitchFamily="18" charset="0"/>
                           </a:rPr>
                         </m:ctrlPr>
@@ -15555,7 +15572,7 @@
                       <m:sSupPr>
                         <m:ctrlPr>
                           <a:rPr lang="en-US" sz="2800" b="1" i="1">
-                            <a:latin typeface="Cambria Math" panose="02040503050406030204" pitchFamily="18" charset="0"/>
+                            <a:latin typeface="Cambria Math"/>
                             <a:ea typeface="Cambria Math" panose="02040503050406030204" pitchFamily="18" charset="0"/>
                           </a:rPr>
                         </m:ctrlPr>
@@ -15591,7 +15608,7 @@
                         <m:chr m:val="̇"/>
                         <m:ctrlPr>
                           <a:rPr lang="en-US" sz="2800" b="1" i="1" dirty="0">
-                            <a:latin typeface="Cambria Math" panose="02040503050406030204" pitchFamily="18" charset="0"/>
+                            <a:latin typeface="Cambria Math"/>
                             <a:ea typeface="Cambria Math" panose="02040503050406030204" pitchFamily="18" charset="0"/>
                           </a:rPr>
                         </m:ctrlPr>
@@ -15620,7 +15637,7 @@
                       <m:sSupPr>
                         <m:ctrlPr>
                           <a:rPr lang="en-US" sz="2800" b="1" i="1">
-                            <a:latin typeface="Cambria Math" panose="02040503050406030204" pitchFamily="18" charset="0"/>
+                            <a:latin typeface="Cambria Math"/>
                             <a:ea typeface="Cambria Math" panose="02040503050406030204" pitchFamily="18" charset="0"/>
                           </a:rPr>
                         </m:ctrlPr>
@@ -15745,7 +15762,7 @@
                             <a:solidFill>
                               <a:schemeClr val="tx1"/>
                             </a:solidFill>
-                            <a:latin typeface="Cambria Math" panose="02040503050406030204" pitchFamily="18" charset="0"/>
+                            <a:latin typeface="Cambria Math"/>
                             <a:ea typeface="Cambria Math" panose="02040503050406030204" pitchFamily="18" charset="0"/>
                           </a:rPr>
                         </m:ctrlPr>
@@ -15851,7 +15868,7 @@
                             <a:solidFill>
                               <a:schemeClr val="tx1"/>
                             </a:solidFill>
-                            <a:latin typeface="Cambria Math" panose="02040503050406030204" pitchFamily="18" charset="0"/>
+                            <a:latin typeface="Cambria Math"/>
                             <a:ea typeface="Cambria Math" panose="02040503050406030204" pitchFamily="18" charset="0"/>
                           </a:rPr>
                         </m:ctrlPr>
@@ -15948,7 +15965,7 @@
           <p:cNvPr id="5" name="Text Placeholder 4">
             <a:extLst>
               <a:ext uri="{FF2B5EF4-FFF2-40B4-BE49-F238E27FC236}">
-                <a16:creationId xmlns:a16="http://schemas.microsoft.com/office/drawing/2014/main" id="{765BDC8F-0263-A0B0-6FAA-45306234E8E7}"/>
+                <a16:creationId xmlns:a16="http://schemas.microsoft.com/office/drawing/2014/main" xmlns="" id="{765BDC8F-0263-A0B0-6FAA-45306234E8E7}"/>
               </a:ext>
             </a:extLst>
           </p:cNvPr>
@@ -15973,7 +15990,7 @@
           <p:cNvPr id="3" name="Title 2">
             <a:extLst>
               <a:ext uri="{FF2B5EF4-FFF2-40B4-BE49-F238E27FC236}">
-                <a16:creationId xmlns:a16="http://schemas.microsoft.com/office/drawing/2014/main" id="{50565C50-E748-144D-EE38-D33ACC6875BB}"/>
+                <a16:creationId xmlns:a16="http://schemas.microsoft.com/office/drawing/2014/main" xmlns="" id="{50565C50-E748-144D-EE38-D33ACC6875BB}"/>
               </a:ext>
             </a:extLst>
           </p:cNvPr>
@@ -16126,7 +16143,7 @@
                             <a:solidFill>
                               <a:srgbClr val="C00000"/>
                             </a:solidFill>
-                            <a:latin typeface="Cambria Math" panose="02040503050406030204" pitchFamily="18" charset="0"/>
+                            <a:latin typeface="Cambria Math"/>
                             <a:ea typeface="Cambria Math" panose="02040503050406030204" pitchFamily="18" charset="0"/>
                           </a:rPr>
                         </m:ctrlPr>
@@ -16161,7 +16178,7 @@
                             <a:solidFill>
                               <a:srgbClr val="C00000"/>
                             </a:solidFill>
-                            <a:latin typeface="Cambria Math" panose="02040503050406030204" pitchFamily="18" charset="0"/>
+                            <a:latin typeface="Cambria Math"/>
                             <a:ea typeface="Cambria Math" panose="02040503050406030204" pitchFamily="18" charset="0"/>
                           </a:rPr>
                         </m:ctrlPr>
@@ -16218,7 +16235,7 @@
                             <a:solidFill>
                               <a:srgbClr val="C00000"/>
                             </a:solidFill>
-                            <a:latin typeface="Cambria Math" panose="02040503050406030204" pitchFamily="18" charset="0"/>
+                            <a:latin typeface="Cambria Math"/>
                             <a:ea typeface="Cambria Math" panose="02040503050406030204" pitchFamily="18" charset="0"/>
                           </a:rPr>
                         </m:ctrlPr>
@@ -16263,7 +16280,7 @@
                             <a:solidFill>
                               <a:srgbClr val="C00000"/>
                             </a:solidFill>
-                            <a:latin typeface="Cambria Math" panose="02040503050406030204" pitchFamily="18" charset="0"/>
+                            <a:latin typeface="Cambria Math"/>
                             <a:ea typeface="Cambria Math" panose="02040503050406030204" pitchFamily="18" charset="0"/>
                           </a:rPr>
                         </m:ctrlPr>
@@ -16484,7 +16501,7 @@
               <p:cNvPr id="2" name="TextBox 1">
                 <a:extLst>
                   <a:ext uri="{FF2B5EF4-FFF2-40B4-BE49-F238E27FC236}">
-                    <a16:creationId xmlns:a16="http://schemas.microsoft.com/office/drawing/2014/main" id="{0A073420-6973-7C43-B520-D0AAF309402E}"/>
+                    <a16:creationId xmlns:a16="http://schemas.microsoft.com/office/drawing/2014/main" xmlns="" id="{0A073420-6973-7C43-B520-D0AAF309402E}"/>
                   </a:ext>
                 </a:extLst>
               </p:cNvPr>
@@ -16612,7 +16629,7 @@
                               <a:solidFill>
                                 <a:schemeClr val="tx1"/>
                               </a:solidFill>
-                              <a:latin typeface="Cambria Math" panose="02040503050406030204" pitchFamily="18" charset="0"/>
+                              <a:latin typeface="Cambria Math"/>
                             </a:rPr>
                           </m:ctrlPr>
                         </m:fPr>
@@ -16730,7 +16747,7 @@
               <p:cNvPr id="7" name="Rectangle 6">
                 <a:extLst>
                   <a:ext uri="{FF2B5EF4-FFF2-40B4-BE49-F238E27FC236}">
-                    <a16:creationId xmlns:a16="http://schemas.microsoft.com/office/drawing/2014/main" id="{8CEE10CA-39FE-E945-BEA9-CCD929F95A8D}"/>
+                    <a16:creationId xmlns:a16="http://schemas.microsoft.com/office/drawing/2014/main" xmlns="" id="{8CEE10CA-39FE-E945-BEA9-CCD929F95A8D}"/>
                   </a:ext>
                 </a:extLst>
               </p:cNvPr>
@@ -16801,7 +16818,7 @@
                               <a:solidFill>
                                 <a:schemeClr val="tx1"/>
                               </a:solidFill>
-                              <a:latin typeface="Cambria Math" panose="02040503050406030204" pitchFamily="18" charset="0"/>
+                              <a:latin typeface="Cambria Math"/>
                             </a:rPr>
                           </m:ctrlPr>
                         </m:dPr>
@@ -16842,7 +16859,7 @@
                               <a:solidFill>
                                 <a:schemeClr val="tx1"/>
                               </a:solidFill>
-                              <a:latin typeface="Cambria Math" panose="02040503050406030204" pitchFamily="18" charset="0"/>
+                              <a:latin typeface="Cambria Math"/>
                             </a:rPr>
                           </m:ctrlPr>
                         </m:dPr>
@@ -16864,7 +16881,7 @@
                                   <a:solidFill>
                                     <a:schemeClr val="tx1"/>
                                   </a:solidFill>
-                                  <a:latin typeface="Cambria Math" panose="02040503050406030204" pitchFamily="18" charset="0"/>
+                                  <a:latin typeface="Cambria Math"/>
                                   <a:ea typeface="Cambria Math" panose="02040503050406030204" pitchFamily="18" charset="0"/>
                                 </a:rPr>
                               </m:ctrlPr>
@@ -16901,7 +16918,7 @@
                                   <a:solidFill>
                                     <a:schemeClr val="tx1"/>
                                   </a:solidFill>
-                                  <a:latin typeface="Cambria Math" panose="02040503050406030204" pitchFamily="18" charset="0"/>
+                                  <a:latin typeface="Cambria Math"/>
                                   <a:ea typeface="Cambria Math" panose="02040503050406030204" pitchFamily="18" charset="0"/>
                                 </a:rPr>
                               </m:ctrlPr>
@@ -16936,7 +16953,7 @@
                                   <a:solidFill>
                                     <a:schemeClr val="tx1"/>
                                   </a:solidFill>
-                                  <a:latin typeface="Cambria Math" panose="02040503050406030204" pitchFamily="18" charset="0"/>
+                                  <a:latin typeface="Cambria Math"/>
                                   <a:ea typeface="Cambria Math" panose="02040503050406030204" pitchFamily="18" charset="0"/>
                                 </a:rPr>
                               </m:ctrlPr>
@@ -16973,7 +16990,7 @@
                                   <a:solidFill>
                                     <a:schemeClr val="tx1"/>
                                   </a:solidFill>
-                                  <a:latin typeface="Cambria Math" panose="02040503050406030204" pitchFamily="18" charset="0"/>
+                                  <a:latin typeface="Cambria Math"/>
                                   <a:ea typeface="Cambria Math" panose="02040503050406030204" pitchFamily="18" charset="0"/>
                                 </a:rPr>
                               </m:ctrlPr>
@@ -16986,7 +17003,7 @@
                                       <a:solidFill>
                                         <a:schemeClr val="tx1"/>
                                       </a:solidFill>
-                                      <a:latin typeface="Cambria Math" panose="02040503050406030204" pitchFamily="18" charset="0"/>
+                                      <a:latin typeface="Cambria Math"/>
                                       <a:ea typeface="Cambria Math" panose="02040503050406030204" pitchFamily="18" charset="0"/>
                                     </a:rPr>
                                   </m:ctrlPr>
@@ -17056,7 +17073,7 @@
                               <a:solidFill>
                                 <a:schemeClr val="tx1"/>
                               </a:solidFill>
-                              <a:latin typeface="Cambria Math" panose="02040503050406030204" pitchFamily="18" charset="0"/>
+                              <a:latin typeface="Cambria Math"/>
                               <a:ea typeface="Cambria Math" panose="02040503050406030204" pitchFamily="18" charset="0"/>
                             </a:rPr>
                           </m:ctrlPr>
@@ -17093,7 +17110,7 @@
                               <a:solidFill>
                                 <a:schemeClr val="tx1"/>
                               </a:solidFill>
-                              <a:latin typeface="Cambria Math" panose="02040503050406030204" pitchFamily="18" charset="0"/>
+                              <a:latin typeface="Cambria Math"/>
                               <a:ea typeface="Cambria Math" panose="02040503050406030204" pitchFamily="18" charset="0"/>
                             </a:rPr>
                           </m:ctrlPr>
@@ -17157,7 +17174,7 @@
                             <a:solidFill>
                               <a:schemeClr val="tx1"/>
                             </a:solidFill>
-                            <a:latin typeface="Cambria Math" panose="02040503050406030204" pitchFamily="18" charset="0"/>
+                            <a:latin typeface="Cambria Math"/>
                             <a:ea typeface="Cambria Math" panose="02040503050406030204" pitchFamily="18" charset="0"/>
                           </a:rPr>
                         </m:ctrlPr>
@@ -17212,7 +17229,7 @@
                                 <a:solidFill>
                                   <a:schemeClr val="tx1"/>
                                 </a:solidFill>
-                                <a:latin typeface="Cambria Math" panose="02040503050406030204" pitchFamily="18" charset="0"/>
+                                <a:latin typeface="Cambria Math"/>
                                 <a:ea typeface="Cambria Math" panose="02040503050406030204" pitchFamily="18" charset="0"/>
                               </a:rPr>
                             </m:ctrlPr>
@@ -17261,7 +17278,7 @@
                             <a:solidFill>
                               <a:schemeClr val="tx1"/>
                             </a:solidFill>
-                            <a:latin typeface="Cambria Math" panose="02040503050406030204" pitchFamily="18" charset="0"/>
+                            <a:latin typeface="Cambria Math"/>
                             <a:ea typeface="Cambria Math" panose="02040503050406030204" pitchFamily="18" charset="0"/>
                           </a:rPr>
                         </m:ctrlPr>
@@ -17323,7 +17340,7 @@
                           <m:sSupPr>
                             <m:ctrlPr>
                               <a:rPr lang="en-CA" sz="2800" i="1">
-                                <a:latin typeface="Cambria Math" panose="02040503050406030204" pitchFamily="18" charset="0"/>
+                                <a:latin typeface="Cambria Math"/>
                                 <a:ea typeface="Cambria Math" panose="02040503050406030204" pitchFamily="18" charset="0"/>
                               </a:rPr>
                             </m:ctrlPr>
@@ -17366,7 +17383,7 @@
                             <a:solidFill>
                               <a:schemeClr val="tx1"/>
                             </a:solidFill>
-                            <a:latin typeface="Cambria Math" panose="02040503050406030204" pitchFamily="18" charset="0"/>
+                            <a:latin typeface="Cambria Math"/>
                             <a:ea typeface="Cambria Math" panose="02040503050406030204" pitchFamily="18" charset="0"/>
                           </a:rPr>
                         </m:ctrlPr>
@@ -17448,7 +17465,7 @@
                           <m:sSupPr>
                             <m:ctrlPr>
                               <a:rPr lang="en-CA" sz="2800" i="1">
-                                <a:latin typeface="Cambria Math" panose="02040503050406030204" pitchFamily="18" charset="0"/>
+                                <a:latin typeface="Cambria Math"/>
                                 <a:ea typeface="Cambria Math" panose="02040503050406030204" pitchFamily="18" charset="0"/>
                               </a:rPr>
                             </m:ctrlPr>
@@ -17494,7 +17511,7 @@
                             <a:solidFill>
                               <a:schemeClr val="tx1"/>
                             </a:solidFill>
-                            <a:latin typeface="Cambria Math" panose="02040503050406030204" pitchFamily="18" charset="0"/>
+                            <a:latin typeface="Cambria Math"/>
                             <a:ea typeface="Cambria Math" panose="02040503050406030204" pitchFamily="18" charset="0"/>
                           </a:rPr>
                         </m:ctrlPr>
@@ -17569,7 +17586,7 @@
                                 <a:solidFill>
                                   <a:schemeClr val="tx1"/>
                                 </a:solidFill>
-                                <a:latin typeface="Cambria Math" panose="02040503050406030204" pitchFamily="18" charset="0"/>
+                                <a:latin typeface="Cambria Math"/>
                                 <a:ea typeface="Cambria Math" panose="02040503050406030204" pitchFamily="18" charset="0"/>
                               </a:rPr>
                             </m:ctrlPr>
@@ -17618,7 +17635,7 @@
                             <a:solidFill>
                               <a:schemeClr val="tx1"/>
                             </a:solidFill>
-                            <a:latin typeface="Cambria Math" panose="02040503050406030204" pitchFamily="18" charset="0"/>
+                            <a:latin typeface="Cambria Math"/>
                             <a:ea typeface="Cambria Math" panose="02040503050406030204" pitchFamily="18" charset="0"/>
                           </a:rPr>
                         </m:ctrlPr>
@@ -17673,7 +17690,7 @@
                                 <a:solidFill>
                                   <a:schemeClr val="tx1"/>
                                 </a:solidFill>
-                                <a:latin typeface="Cambria Math" panose="02040503050406030204" pitchFamily="18" charset="0"/>
+                                <a:latin typeface="Cambria Math"/>
                                 <a:ea typeface="Cambria Math" panose="02040503050406030204" pitchFamily="18" charset="0"/>
                               </a:rPr>
                             </m:ctrlPr>
@@ -17773,7 +17790,7 @@
               <p:cNvPr id="8" name="Rectangle 7">
                 <a:extLst>
                   <a:ext uri="{FF2B5EF4-FFF2-40B4-BE49-F238E27FC236}">
-                    <a16:creationId xmlns:a16="http://schemas.microsoft.com/office/drawing/2014/main" id="{D03E2165-EF8C-3144-B180-FE3FE5FCBEA6}"/>
+                    <a16:creationId xmlns:a16="http://schemas.microsoft.com/office/drawing/2014/main" xmlns="" id="{D03E2165-EF8C-3144-B180-FE3FE5FCBEA6}"/>
                   </a:ext>
                 </a:extLst>
               </p:cNvPr>
@@ -17809,7 +17826,7 @@
                               <a:solidFill>
                                 <a:srgbClr val="7030A0"/>
                               </a:solidFill>
-                              <a:latin typeface="Cambria Math" panose="02040503050406030204" pitchFamily="18" charset="0"/>
+                              <a:latin typeface="Cambria Math"/>
                             </a:rPr>
                           </m:ctrlPr>
                         </m:sSubPr>
@@ -17843,7 +17860,7 @@
                               <a:solidFill>
                                 <a:srgbClr val="7030A0"/>
                               </a:solidFill>
-                              <a:latin typeface="Cambria Math" panose="02040503050406030204" pitchFamily="18" charset="0"/>
+                              <a:latin typeface="Cambria Math"/>
                             </a:rPr>
                           </m:ctrlPr>
                         </m:dPr>
@@ -17884,7 +17901,7 @@
                               <a:solidFill>
                                 <a:srgbClr val="7030A0"/>
                               </a:solidFill>
-                              <a:latin typeface="Cambria Math" panose="02040503050406030204" pitchFamily="18" charset="0"/>
+                              <a:latin typeface="Cambria Math"/>
                             </a:rPr>
                           </m:ctrlPr>
                         </m:sSupPr>
@@ -17936,7 +17953,7 @@
                               <a:solidFill>
                                 <a:srgbClr val="7030A0"/>
                               </a:solidFill>
-                              <a:latin typeface="Cambria Math" panose="02040503050406030204" pitchFamily="18" charset="0"/>
+                              <a:latin typeface="Cambria Math"/>
                             </a:rPr>
                           </m:ctrlPr>
                         </m:dPr>
@@ -17977,7 +17994,7 @@
                               <a:solidFill>
                                 <a:srgbClr val="7030A0"/>
                               </a:solidFill>
-                              <a:latin typeface="Cambria Math" panose="02040503050406030204" pitchFamily="18" charset="0"/>
+                              <a:latin typeface="Cambria Math"/>
                             </a:rPr>
                           </m:ctrlPr>
                         </m:dPr>
@@ -18018,7 +18035,7 @@
                               <a:solidFill>
                                 <a:srgbClr val="7030A0"/>
                               </a:solidFill>
-                              <a:latin typeface="Cambria Math" panose="02040503050406030204" pitchFamily="18" charset="0"/>
+                              <a:latin typeface="Cambria Math"/>
                             </a:rPr>
                           </m:ctrlPr>
                         </m:sSupPr>
@@ -18070,7 +18087,7 @@
                               <a:solidFill>
                                 <a:srgbClr val="7030A0"/>
                               </a:solidFill>
-                              <a:latin typeface="Cambria Math" panose="02040503050406030204" pitchFamily="18" charset="0"/>
+                              <a:latin typeface="Cambria Math"/>
                             </a:rPr>
                           </m:ctrlPr>
                         </m:dPr>
@@ -18111,7 +18128,7 @@
                               <a:solidFill>
                                 <a:srgbClr val="7030A0"/>
                               </a:solidFill>
-                              <a:latin typeface="Cambria Math" panose="02040503050406030204" pitchFamily="18" charset="0"/>
+                              <a:latin typeface="Cambria Math"/>
                             </a:rPr>
                           </m:ctrlPr>
                         </m:dPr>
@@ -18342,7 +18359,7 @@
                           <m:endChr m:val="]"/>
                           <m:ctrlPr>
                             <a:rPr lang="en-US" sz="2800" b="0" i="1" smtClean="0">
-                              <a:latin typeface="Cambria Math" panose="02040503050406030204" pitchFamily="18" charset="0"/>
+                              <a:latin typeface="Cambria Math"/>
                             </a:rPr>
                           </m:ctrlPr>
                         </m:dPr>
@@ -18352,7 +18369,7 @@
                               <m:limLoc m:val="undOvr"/>
                               <m:ctrlPr>
                                 <a:rPr lang="en-US" sz="2800" b="0" i="1" smtClean="0">
-                                  <a:latin typeface="Cambria Math" panose="02040503050406030204" pitchFamily="18" charset="0"/>
+                                  <a:latin typeface="Cambria Math"/>
                                 </a:rPr>
                               </m:ctrlPr>
                             </m:naryPr>
@@ -18361,7 +18378,7 @@
                                 <m:sSupPr>
                                   <m:ctrlPr>
                                     <a:rPr lang="en-US" sz="2800" b="0" i="1" smtClean="0">
-                                      <a:latin typeface="Cambria Math" panose="02040503050406030204" pitchFamily="18" charset="0"/>
+                                      <a:latin typeface="Cambria Math"/>
                                     </a:rPr>
                                   </m:ctrlPr>
                                 </m:sSupPr>
@@ -18403,7 +18420,7 @@
                                 <m:dPr>
                                   <m:ctrlPr>
                                     <a:rPr lang="en-US" sz="2800" b="0" i="1" smtClean="0">
-                                      <a:latin typeface="Cambria Math" panose="02040503050406030204" pitchFamily="18" charset="0"/>
+                                      <a:latin typeface="Cambria Math"/>
                                     </a:rPr>
                                   </m:ctrlPr>
                                 </m:dPr>
@@ -18436,7 +18453,7 @@
                         <m:fPr>
                           <m:ctrlPr>
                             <a:rPr lang="en-US" sz="2800" b="0" i="1" smtClean="0">
-                              <a:latin typeface="Cambria Math" panose="02040503050406030204" pitchFamily="18" charset="0"/>
+                              <a:latin typeface="Cambria Math"/>
                             </a:rPr>
                           </m:ctrlPr>
                         </m:fPr>
@@ -18565,7 +18582,7 @@
                           <m:endChr m:val="]"/>
                           <m:ctrlPr>
                             <a:rPr lang="en-US" sz="2800" b="0" i="1" smtClean="0">
-                              <a:latin typeface="Cambria Math" panose="02040503050406030204" pitchFamily="18" charset="0"/>
+                              <a:latin typeface="Cambria Math"/>
                             </a:rPr>
                           </m:ctrlPr>
                         </m:dPr>
@@ -18575,7 +18592,7 @@
                               <m:limLoc m:val="undOvr"/>
                               <m:ctrlPr>
                                 <a:rPr lang="en-US" sz="2800" b="0" i="1" smtClean="0">
-                                  <a:latin typeface="Cambria Math" panose="02040503050406030204" pitchFamily="18" charset="0"/>
+                                  <a:latin typeface="Cambria Math"/>
                                 </a:rPr>
                               </m:ctrlPr>
                             </m:naryPr>
@@ -18614,7 +18631,7 @@
                                 <m:dPr>
                                   <m:ctrlPr>
                                     <a:rPr lang="en-US" sz="2800" b="0" i="1" smtClean="0">
-                                      <a:latin typeface="Cambria Math" panose="02040503050406030204" pitchFamily="18" charset="0"/>
+                                      <a:latin typeface="Cambria Math"/>
                                     </a:rPr>
                                   </m:ctrlPr>
                                 </m:dPr>
@@ -18647,7 +18664,7 @@
                         <m:fPr>
                           <m:ctrlPr>
                             <a:rPr lang="en-US" sz="2800" b="0" i="1" smtClean="0">
-                              <a:latin typeface="Cambria Math" panose="02040503050406030204" pitchFamily="18" charset="0"/>
+                              <a:latin typeface="Cambria Math"/>
                             </a:rPr>
                           </m:ctrlPr>
                         </m:fPr>
@@ -18696,7 +18713,7 @@
                         <m:fPr>
                           <m:ctrlPr>
                             <a:rPr lang="en-US" sz="2800" b="0" i="1" smtClean="0">
-                              <a:latin typeface="Cambria Math" panose="02040503050406030204" pitchFamily="18" charset="0"/>
+                              <a:latin typeface="Cambria Math"/>
                             </a:rPr>
                           </m:ctrlPr>
                         </m:fPr>
@@ -18706,7 +18723,7 @@
                               <m:limLoc m:val="undOvr"/>
                               <m:ctrlPr>
                                 <a:rPr lang="en-US" sz="2800" b="0" i="1" smtClean="0">
-                                  <a:latin typeface="Cambria Math" panose="02040503050406030204" pitchFamily="18" charset="0"/>
+                                  <a:latin typeface="Cambria Math"/>
                                 </a:rPr>
                               </m:ctrlPr>
                             </m:naryPr>
@@ -18733,7 +18750,7 @@
                                 <m:sSupPr>
                                   <m:ctrlPr>
                                     <a:rPr lang="en-US" sz="2800" b="0" i="1" smtClean="0">
-                                      <a:latin typeface="Cambria Math" panose="02040503050406030204" pitchFamily="18" charset="0"/>
+                                      <a:latin typeface="Cambria Math"/>
                                     </a:rPr>
                                   </m:ctrlPr>
                                 </m:sSupPr>
@@ -18766,7 +18783,7 @@
                                 <m:dPr>
                                   <m:ctrlPr>
                                     <a:rPr lang="en-US" sz="2800" b="0" i="1" smtClean="0">
-                                      <a:latin typeface="Cambria Math" panose="02040503050406030204" pitchFamily="18" charset="0"/>
+                                      <a:latin typeface="Cambria Math"/>
                                     </a:rPr>
                                   </m:ctrlPr>
                                 </m:dPr>
@@ -18947,7 +18964,7 @@
                       <m:dPr>
                         <m:ctrlPr>
                           <a:rPr lang="en-US" sz="3200" b="0" i="1" smtClean="0">
-                            <a:latin typeface="Cambria Math" panose="02040503050406030204" pitchFamily="18" charset="0"/>
+                            <a:latin typeface="Cambria Math"/>
                           </a:rPr>
                         </m:ctrlPr>
                       </m:dPr>
@@ -18973,7 +18990,7 @@
                         <m:limLoc m:val="undOvr"/>
                         <m:ctrlPr>
                           <a:rPr lang="en-US" sz="3200" i="1" dirty="0" smtClean="0">
-                            <a:latin typeface="Cambria Math" panose="02040503050406030204" pitchFamily="18" charset="0"/>
+                            <a:latin typeface="Cambria Math"/>
                           </a:rPr>
                         </m:ctrlPr>
                       </m:naryPr>
@@ -19014,7 +19031,7 @@
                           <m:dPr>
                             <m:ctrlPr>
                               <a:rPr lang="en-US" sz="3200" b="0" i="1" dirty="0" smtClean="0">
-                                <a:latin typeface="Cambria Math" panose="02040503050406030204" pitchFamily="18" charset="0"/>
+                                <a:latin typeface="Cambria Math"/>
                               </a:rPr>
                             </m:ctrlPr>
                           </m:dPr>
@@ -19064,7 +19081,7 @@
                           <m:dPr>
                             <m:ctrlPr>
                               <a:rPr lang="en-US" sz="3200" b="0" i="1" dirty="0" smtClean="0">
-                                <a:latin typeface="Cambria Math" panose="02040503050406030204" pitchFamily="18" charset="0"/>
+                                <a:latin typeface="Cambria Math"/>
                               </a:rPr>
                             </m:ctrlPr>
                           </m:dPr>
@@ -19073,7 +19090,7 @@
                               <m:sSupPr>
                                 <m:ctrlPr>
                                   <a:rPr lang="en-US" sz="3200" b="0" i="1" dirty="0" smtClean="0">
-                                    <a:latin typeface="Cambria Math" panose="02040503050406030204" pitchFamily="18" charset="0"/>
+                                    <a:latin typeface="Cambria Math"/>
                                   </a:rPr>
                                 </m:ctrlPr>
                               </m:sSupPr>
@@ -19107,7 +19124,7 @@
                             <m:limLoc m:val="undOvr"/>
                             <m:ctrlPr>
                               <a:rPr lang="en-US" sz="3200" b="0" i="1" dirty="0" smtClean="0">
-                                <a:latin typeface="Cambria Math" panose="02040503050406030204" pitchFamily="18" charset="0"/>
+                                <a:latin typeface="Cambria Math"/>
                               </a:rPr>
                             </m:ctrlPr>
                           </m:naryPr>
@@ -19134,7 +19151,7 @@
                               <m:sSupPr>
                                 <m:ctrlPr>
                                   <a:rPr lang="en-US" sz="3200" b="0" i="1" dirty="0" smtClean="0">
-                                    <a:latin typeface="Cambria Math" panose="02040503050406030204" pitchFamily="18" charset="0"/>
+                                    <a:latin typeface="Cambria Math"/>
                                   </a:rPr>
                                 </m:ctrlPr>
                               </m:sSupPr>
@@ -19167,7 +19184,7 @@
                               <m:dPr>
                                 <m:ctrlPr>
                                   <a:rPr lang="en-US" sz="3200" i="1" dirty="0">
-                                    <a:latin typeface="Cambria Math" panose="02040503050406030204" pitchFamily="18" charset="0"/>
+                                    <a:latin typeface="Cambria Math"/>
                                   </a:rPr>
                                 </m:ctrlPr>
                               </m:dPr>
@@ -19318,7 +19335,7 @@
                       <m:dPr>
                         <m:ctrlPr>
                           <a:rPr lang="en-US" sz="2800" b="0" i="1" smtClean="0">
-                            <a:latin typeface="Cambria Math" panose="02040503050406030204" pitchFamily="18" charset="0"/>
+                            <a:latin typeface="Cambria Math"/>
                             <a:ea typeface="Cambria Math" panose="02040503050406030204" pitchFamily="18" charset="0"/>
                           </a:rPr>
                         </m:ctrlPr>
@@ -19344,7 +19361,7 @@
                       <m:fPr>
                         <m:ctrlPr>
                           <a:rPr lang="en-US" sz="2800" b="0" i="1" smtClean="0">
-                            <a:latin typeface="Cambria Math" panose="02040503050406030204" pitchFamily="18" charset="0"/>
+                            <a:latin typeface="Cambria Math"/>
                             <a:ea typeface="Cambria Math" panose="02040503050406030204" pitchFamily="18" charset="0"/>
                           </a:rPr>
                         </m:ctrlPr>
@@ -19382,7 +19399,7 @@
                       <m:dPr>
                         <m:ctrlPr>
                           <a:rPr lang="en-US" sz="2800" b="0" i="1" smtClean="0">
-                            <a:latin typeface="Cambria Math" panose="02040503050406030204" pitchFamily="18" charset="0"/>
+                            <a:latin typeface="Cambria Math"/>
                             <a:ea typeface="Cambria Math" panose="02040503050406030204" pitchFamily="18" charset="0"/>
                           </a:rPr>
                         </m:ctrlPr>
@@ -19457,7 +19474,7 @@
                       <m:dPr>
                         <m:ctrlPr>
                           <a:rPr lang="en-US" sz="2800" b="0" i="1" smtClean="0">
-                            <a:latin typeface="Cambria Math" panose="02040503050406030204" pitchFamily="18" charset="0"/>
+                            <a:latin typeface="Cambria Math"/>
                             <a:ea typeface="Cambria Math" panose="02040503050406030204" pitchFamily="18" charset="0"/>
                           </a:rPr>
                         </m:ctrlPr>
@@ -19522,7 +19539,7 @@
                       <m:sSupPr>
                         <m:ctrlPr>
                           <a:rPr lang="en-US" sz="2800" i="1" dirty="0" smtClean="0">
-                            <a:latin typeface="Cambria Math" panose="02040503050406030204" pitchFamily="18" charset="0"/>
+                            <a:latin typeface="Cambria Math"/>
                             <a:ea typeface="Cambria Math" panose="02040503050406030204" pitchFamily="18" charset="0"/>
                           </a:rPr>
                         </m:ctrlPr>
@@ -19668,7 +19685,7 @@
                             <a:solidFill>
                               <a:srgbClr val="7030A0"/>
                             </a:solidFill>
-                            <a:latin typeface="Cambria Math" panose="02040503050406030204" pitchFamily="18" charset="0"/>
+                            <a:latin typeface="Cambria Math"/>
                             <a:ea typeface="Cambria Math" panose="02040503050406030204" pitchFamily="18" charset="0"/>
                           </a:rPr>
                         </m:ctrlPr>
@@ -19703,7 +19720,7 @@
                             <a:solidFill>
                               <a:srgbClr val="7030A0"/>
                             </a:solidFill>
-                            <a:latin typeface="Cambria Math" panose="02040503050406030204" pitchFamily="18" charset="0"/>
+                            <a:latin typeface="Cambria Math"/>
                             <a:ea typeface="Cambria Math" panose="02040503050406030204" pitchFamily="18" charset="0"/>
                           </a:rPr>
                         </m:ctrlPr>
@@ -19780,7 +19797,7 @@
                             <a:solidFill>
                               <a:srgbClr val="7030A0"/>
                             </a:solidFill>
-                            <a:latin typeface="Cambria Math" panose="02040503050406030204" pitchFamily="18" charset="0"/>
+                            <a:latin typeface="Cambria Math"/>
                             <a:ea typeface="Cambria Math" panose="02040503050406030204" pitchFamily="18" charset="0"/>
                           </a:rPr>
                         </m:ctrlPr>
@@ -19816,7 +19833,7 @@
                                 <a:solidFill>
                                   <a:srgbClr val="7030A0"/>
                                 </a:solidFill>
-                                <a:latin typeface="Cambria Math" panose="02040503050406030204" pitchFamily="18" charset="0"/>
+                                <a:latin typeface="Cambria Math"/>
                                 <a:ea typeface="Cambria Math" panose="02040503050406030204" pitchFamily="18" charset="0"/>
                               </a:rPr>
                             </m:ctrlPr>
@@ -19887,7 +19904,7 @@
                             <a:solidFill>
                               <a:srgbClr val="7030A0"/>
                             </a:solidFill>
-                            <a:latin typeface="Cambria Math" panose="02040503050406030204" pitchFamily="18" charset="0"/>
+                            <a:latin typeface="Cambria Math"/>
                             <a:ea typeface="Cambria Math" panose="02040503050406030204" pitchFamily="18" charset="0"/>
                           </a:rPr>
                         </m:ctrlPr>
@@ -19968,7 +19985,7 @@
                             <a:solidFill>
                               <a:srgbClr val="7030A0"/>
                             </a:solidFill>
-                            <a:latin typeface="Cambria Math" panose="02040503050406030204" pitchFamily="18" charset="0"/>
+                            <a:latin typeface="Cambria Math"/>
                             <a:ea typeface="Cambria Math" panose="02040503050406030204" pitchFamily="18" charset="0"/>
                           </a:rPr>
                         </m:ctrlPr>
@@ -19982,7 +19999,7 @@
                                 <a:solidFill>
                                   <a:srgbClr val="7030A0"/>
                                 </a:solidFill>
-                                <a:latin typeface="Cambria Math" panose="02040503050406030204" pitchFamily="18" charset="0"/>
+                                <a:latin typeface="Cambria Math"/>
                               </a:rPr>
                             </m:ctrlPr>
                           </m:naryPr>
@@ -20018,7 +20035,7 @@
                                     <a:solidFill>
                                       <a:srgbClr val="7030A0"/>
                                     </a:solidFill>
-                                    <a:latin typeface="Cambria Math" panose="02040503050406030204" pitchFamily="18" charset="0"/>
+                                    <a:latin typeface="Cambria Math"/>
                                   </a:rPr>
                                 </m:ctrlPr>
                               </m:sSupPr>
@@ -20063,7 +20080,7 @@
                                     <a:solidFill>
                                       <a:srgbClr val="7030A0"/>
                                     </a:solidFill>
-                                    <a:latin typeface="Cambria Math" panose="02040503050406030204" pitchFamily="18" charset="0"/>
+                                    <a:latin typeface="Cambria Math"/>
                                   </a:rPr>
                                 </m:ctrlPr>
                               </m:dPr>
@@ -20163,6 +20180,14 @@
   <p:clrMapOvr>
     <a:masterClrMapping/>
   </p:clrMapOvr>
+  <mc:AlternateContent xmlns:mc="http://schemas.openxmlformats.org/markup-compatibility/2006">
+    <mc:Choice xmlns:p14="http://schemas.microsoft.com/office/powerpoint/2010/main" Requires="p14">
+      <p:transition spd="slow" p14:dur="2000"/>
+    </mc:Choice>
+    <mc:Fallback>
+      <p:transition spd="slow"/>
+    </mc:Fallback>
+  </mc:AlternateContent>
 </p:sld>
 </file>
 
@@ -20259,7 +20284,7 @@
                           <m:limLoc m:val="undOvr"/>
                           <m:ctrlPr>
                             <a:rPr lang="en-US" sz="2600" b="0" i="1" smtClean="0">
-                              <a:latin typeface="Cambria Math" panose="02040503050406030204" pitchFamily="18" charset="0"/>
+                              <a:latin typeface="Cambria Math"/>
                             </a:rPr>
                           </m:ctrlPr>
                         </m:naryPr>
@@ -20268,7 +20293,7 @@
                             <m:sSupPr>
                               <m:ctrlPr>
                                 <a:rPr lang="en-US" sz="2600" b="0" i="1" smtClean="0">
-                                  <a:latin typeface="Cambria Math" panose="02040503050406030204" pitchFamily="18" charset="0"/>
+                                  <a:latin typeface="Cambria Math"/>
                                 </a:rPr>
                               </m:ctrlPr>
                             </m:sSupPr>
@@ -20310,7 +20335,7 @@
                             <m:dPr>
                               <m:ctrlPr>
                                 <a:rPr lang="en-US" sz="2600" b="0" i="1" smtClean="0">
-                                  <a:latin typeface="Cambria Math" panose="02040503050406030204" pitchFamily="18" charset="0"/>
+                                  <a:latin typeface="Cambria Math"/>
                                 </a:rPr>
                               </m:ctrlPr>
                             </m:dPr>
@@ -20339,7 +20364,7 @@
                             <m:fPr>
                               <m:ctrlPr>
                                 <a:rPr lang="en-US" sz="2600" b="0" i="1" smtClean="0">
-                                  <a:latin typeface="Cambria Math" panose="02040503050406030204" pitchFamily="18" charset="0"/>
+                                  <a:latin typeface="Cambria Math"/>
                                 </a:rPr>
                               </m:ctrlPr>
                             </m:fPr>
@@ -20370,7 +20395,7 @@
                             <m:dPr>
                               <m:ctrlPr>
                                 <a:rPr lang="en-US" sz="2600" b="0" i="1" smtClean="0">
-                                  <a:latin typeface="Cambria Math" panose="02040503050406030204" pitchFamily="18" charset="0"/>
+                                  <a:latin typeface="Cambria Math"/>
                                 </a:rPr>
                               </m:ctrlPr>
                             </m:dPr>
@@ -20539,7 +20564,7 @@
                         <m:fPr>
                           <m:ctrlPr>
                             <a:rPr lang="en-US" sz="2800" b="0" i="1" smtClean="0">
-                              <a:latin typeface="Cambria Math" panose="02040503050406030204" pitchFamily="18" charset="0"/>
+                              <a:latin typeface="Cambria Math"/>
                             </a:rPr>
                           </m:ctrlPr>
                         </m:fPr>
@@ -20594,7 +20619,7 @@
                         <m:dPr>
                           <m:ctrlPr>
                             <a:rPr lang="en-US" sz="2800" b="0" i="1" smtClean="0">
-                              <a:latin typeface="Cambria Math" panose="02040503050406030204" pitchFamily="18" charset="0"/>
+                              <a:latin typeface="Cambria Math"/>
                             </a:rPr>
                           </m:ctrlPr>
                         </m:dPr>
@@ -20623,7 +20648,7 @@
                         <m:dPr>
                           <m:ctrlPr>
                             <a:rPr lang="en-US" sz="2800" b="0" i="1" smtClean="0">
-                              <a:latin typeface="Cambria Math" panose="02040503050406030204" pitchFamily="18" charset="0"/>
+                              <a:latin typeface="Cambria Math"/>
                             </a:rPr>
                           </m:ctrlPr>
                         </m:dPr>
@@ -20632,7 +20657,7 @@
                             <m:sSupPr>
                               <m:ctrlPr>
                                 <a:rPr lang="en-US" sz="2800" b="0" i="1" smtClean="0">
-                                  <a:latin typeface="Cambria Math" panose="02040503050406030204" pitchFamily="18" charset="0"/>
+                                  <a:latin typeface="Cambria Math"/>
                                 </a:rPr>
                               </m:ctrlPr>
                             </m:sSupPr>
@@ -20665,7 +20690,7 @@
                         <m:fPr>
                           <m:ctrlPr>
                             <a:rPr lang="en-US" sz="2800" b="0" i="1" smtClean="0">
-                              <a:latin typeface="Cambria Math" panose="02040503050406030204" pitchFamily="18" charset="0"/>
+                              <a:latin typeface="Cambria Math"/>
                             </a:rPr>
                           </m:ctrlPr>
                         </m:fPr>
@@ -20807,7 +20832,7 @@
                               <a:solidFill>
                                 <a:srgbClr val="7030A0"/>
                               </a:solidFill>
-                              <a:latin typeface="Cambria Math" panose="02040503050406030204" pitchFamily="18" charset="0"/>
+                              <a:latin typeface="Cambria Math"/>
                             </a:rPr>
                           </m:ctrlPr>
                         </m:dPr>
@@ -20819,7 +20844,7 @@
                                   <a:solidFill>
                                     <a:srgbClr val="7030A0"/>
                                   </a:solidFill>
-                                  <a:latin typeface="Cambria Math" panose="02040503050406030204" pitchFamily="18" charset="0"/>
+                                  <a:latin typeface="Cambria Math"/>
                                 </a:rPr>
                               </m:ctrlPr>
                             </m:fPr>
@@ -20891,7 +20916,7 @@
                               <a:solidFill>
                                 <a:srgbClr val="7030A0"/>
                               </a:solidFill>
-                              <a:latin typeface="Cambria Math" panose="02040503050406030204" pitchFamily="18" charset="0"/>
+                              <a:latin typeface="Cambria Math"/>
                             </a:rPr>
                           </m:ctrlPr>
                         </m:dPr>
@@ -20903,7 +20928,7 @@
                                   <a:solidFill>
                                     <a:srgbClr val="7030A0"/>
                                   </a:solidFill>
-                                  <a:latin typeface="Cambria Math" panose="02040503050406030204" pitchFamily="18" charset="0"/>
+                                  <a:latin typeface="Cambria Math"/>
                                 </a:rPr>
                               </m:ctrlPr>
                             </m:sSupPr>
@@ -20948,7 +20973,7 @@
                               <a:solidFill>
                                 <a:srgbClr val="7030A0"/>
                               </a:solidFill>
-                              <a:latin typeface="Cambria Math" panose="02040503050406030204" pitchFamily="18" charset="0"/>
+                              <a:latin typeface="Cambria Math"/>
                             </a:rPr>
                           </m:ctrlPr>
                         </m:fPr>
@@ -21743,7 +21768,7 @@
   <a:extraClrSchemeLst/>
   <a:extLst>
     <a:ext uri="{05A4C25C-085E-4340-85A3-A5531E510DB2}">
-      <thm15:themeFamily xmlns:thm15="http://schemas.microsoft.com/office/thememl/2012/main" name="Office Theme" id="{62F939B6-93AF-4DB8-9C6B-D6C7DFDC589F}" vid="{4A3C46E8-61CC-4603-A589-7422A47A8E4A}"/>
+      <thm15:themeFamily xmlns:thm15="http://schemas.microsoft.com/office/thememl/2012/main" xmlns="" name="Office Theme" id="{62F939B6-93AF-4DB8-9C6B-D6C7DFDC589F}" vid="{4A3C46E8-61CC-4603-A589-7422A47A8E4A}"/>
     </a:ext>
   </a:extLst>
 </a:theme>

</xml_diff>